<commit_message>
Updated presentation and added messagebox for invalid data
</commit_message>
<xml_diff>
--- a/Præsentation.pptx
+++ b/Præsentation.pptx
@@ -5,13 +5,16 @@
     <p:sldMasterId id="2147483648" r:id="rId1"/>
   </p:sldMasterIdLst>
   <p:notesMasterIdLst>
-    <p:notesMasterId r:id="rId6"/>
+    <p:notesMasterId r:id="rId9"/>
   </p:notesMasterIdLst>
   <p:sldIdLst>
     <p:sldId id="256" r:id="rId2"/>
     <p:sldId id="257" r:id="rId3"/>
-    <p:sldId id="258" r:id="rId4"/>
-    <p:sldId id="259" r:id="rId5"/>
+    <p:sldId id="262" r:id="rId4"/>
+    <p:sldId id="258" r:id="rId5"/>
+    <p:sldId id="260" r:id="rId6"/>
+    <p:sldId id="259" r:id="rId7"/>
+    <p:sldId id="261" r:id="rId8"/>
   </p:sldIdLst>
   <p:sldSz cx="12192000" cy="6858000"/>
   <p:notesSz cx="6858000" cy="9144000"/>
@@ -121,118 +124,14 @@
 <file path=ppt/revisionInfo.xml><?xml version="1.0" encoding="utf-8"?>
 <p1510:revInfo xmlns:a="http://schemas.openxmlformats.org/drawingml/2006/main" xmlns:r="http://schemas.openxmlformats.org/officeDocument/2006/relationships" xmlns:p1510="http://schemas.microsoft.com/office/powerpoint/2015/10/main">
   <p1510:revLst>
+    <p1510:client id="{8408A93F-7755-464E-AD80-F58061F8CE1F}" v="103" dt="2019-03-15T12:17:45.951"/>
     <p1510:client id="{8116BDB2-3580-4DD9-9925-6D775CA2397B}" v="137" dt="2019-03-15T12:14:02.462"/>
-    <p1510:client id="{8408A93F-7755-464E-AD80-F58061F8CE1F}" v="103" dt="2019-03-15T12:17:45.951"/>
   </p1510:revLst>
 </p1510:revInfo>
 </file>
 
 <file path=ppt/changesInfos/changesInfo1.xml><?xml version="1.0" encoding="utf-8"?>
 <pc:chgInfo xmlns:a="http://schemas.openxmlformats.org/drawingml/2006/main" xmlns:r="http://schemas.openxmlformats.org/officeDocument/2006/relationships" xmlns:ac="http://schemas.microsoft.com/office/drawing/2013/main/command" xmlns:pc="http://schemas.microsoft.com/office/powerpoint/2013/main/command">
-  <pc:docChgLst>
-    <pc:chgData name="Mathias Thomassen" userId="816551f4347a7810" providerId="LiveId" clId="{8116BDB2-3580-4DD9-9925-6D775CA2397B}"/>
-    <pc:docChg chg="undo custSel mod modSld">
-      <pc:chgData name="Mathias Thomassen" userId="816551f4347a7810" providerId="LiveId" clId="{8116BDB2-3580-4DD9-9925-6D775CA2397B}" dt="2019-03-15T12:14:02.462" v="136" actId="14100"/>
-      <pc:docMkLst>
-        <pc:docMk/>
-      </pc:docMkLst>
-      <pc:sldChg chg="addSp delSp modSp delDesignElem">
-        <pc:chgData name="Mathias Thomassen" userId="816551f4347a7810" providerId="LiveId" clId="{8116BDB2-3580-4DD9-9925-6D775CA2397B}" dt="2019-03-15T12:14:02.462" v="136" actId="14100"/>
-        <pc:sldMkLst>
-          <pc:docMk/>
-          <pc:sldMk cId="1499206831" sldId="257"/>
-        </pc:sldMkLst>
-        <pc:spChg chg="add mod">
-          <ac:chgData name="Mathias Thomassen" userId="816551f4347a7810" providerId="LiveId" clId="{8116BDB2-3580-4DD9-9925-6D775CA2397B}" dt="2019-03-15T12:11:15.754" v="11"/>
-          <ac:spMkLst>
-            <pc:docMk/>
-            <pc:sldMk cId="1499206831" sldId="257"/>
-            <ac:spMk id="2" creationId="{47AAE8B5-D27C-44B8-BD49-C9013715E6FF}"/>
-          </ac:spMkLst>
-        </pc:spChg>
-        <pc:spChg chg="del">
-          <ac:chgData name="Mathias Thomassen" userId="816551f4347a7810" providerId="LiveId" clId="{8116BDB2-3580-4DD9-9925-6D775CA2397B}" dt="2019-03-15T12:10:19.578" v="5" actId="478"/>
-          <ac:spMkLst>
-            <pc:docMk/>
-            <pc:sldMk cId="1499206831" sldId="257"/>
-            <ac:spMk id="3" creationId="{70B1838F-B8F4-4254-B75B-C769531CE4F4}"/>
-          </ac:spMkLst>
-        </pc:spChg>
-        <pc:spChg chg="del">
-          <ac:chgData name="Mathias Thomassen" userId="816551f4347a7810" providerId="LiveId" clId="{8116BDB2-3580-4DD9-9925-6D775CA2397B}" dt="2019-03-15T12:09:41.886" v="0"/>
-          <ac:spMkLst>
-            <pc:docMk/>
-            <pc:sldMk cId="1499206831" sldId="257"/>
-            <ac:spMk id="4" creationId="{156718BD-D217-4A13-B0FF-20FCBA09615D}"/>
-          </ac:spMkLst>
-        </pc:spChg>
-        <pc:spChg chg="add mod">
-          <ac:chgData name="Mathias Thomassen" userId="816551f4347a7810" providerId="LiveId" clId="{8116BDB2-3580-4DD9-9925-6D775CA2397B}" dt="2019-03-15T12:11:15.754" v="11"/>
-          <ac:spMkLst>
-            <pc:docMk/>
-            <pc:sldMk cId="1499206831" sldId="257"/>
-            <ac:spMk id="5" creationId="{14F6ACB7-ED3C-415C-9453-255734A04A20}"/>
-          </ac:spMkLst>
-        </pc:spChg>
-        <pc:spChg chg="add mod">
-          <ac:chgData name="Mathias Thomassen" userId="816551f4347a7810" providerId="LiveId" clId="{8116BDB2-3580-4DD9-9925-6D775CA2397B}" dt="2019-03-15T12:11:43.196" v="24" actId="20577"/>
-          <ac:spMkLst>
-            <pc:docMk/>
-            <pc:sldMk cId="1499206831" sldId="257"/>
-            <ac:spMk id="6" creationId="{72B4C361-1205-4DFC-9BC0-ACE4E6F65FEC}"/>
-          </ac:spMkLst>
-        </pc:spChg>
-        <pc:spChg chg="add mod">
-          <ac:chgData name="Mathias Thomassen" userId="816551f4347a7810" providerId="LiveId" clId="{8116BDB2-3580-4DD9-9925-6D775CA2397B}" dt="2019-03-15T12:13:08.019" v="132" actId="2710"/>
-          <ac:spMkLst>
-            <pc:docMk/>
-            <pc:sldMk cId="1499206831" sldId="257"/>
-            <ac:spMk id="7" creationId="{03C4507C-6D0F-4EE4-99AD-6CE4213206BE}"/>
-          </ac:spMkLst>
-        </pc:spChg>
-        <pc:spChg chg="add del">
-          <ac:chgData name="Mathias Thomassen" userId="816551f4347a7810" providerId="LiveId" clId="{8116BDB2-3580-4DD9-9925-6D775CA2397B}" dt="2019-03-15T12:11:15.754" v="11"/>
-          <ac:spMkLst>
-            <pc:docMk/>
-            <pc:sldMk cId="1499206831" sldId="257"/>
-            <ac:spMk id="19" creationId="{D4C3103B-AE2E-41DA-8805-65F1A948FD5A}"/>
-          </ac:spMkLst>
-        </pc:spChg>
-        <pc:spChg chg="add del">
-          <ac:chgData name="Mathias Thomassen" userId="816551f4347a7810" providerId="LiveId" clId="{8116BDB2-3580-4DD9-9925-6D775CA2397B}" dt="2019-03-15T12:11:15.754" v="11"/>
-          <ac:spMkLst>
-            <pc:docMk/>
-            <pc:sldMk cId="1499206831" sldId="257"/>
-            <ac:spMk id="20" creationId="{E3BC0C31-69A7-4200-9AFE-927230E1E04C}"/>
-          </ac:spMkLst>
-        </pc:spChg>
-        <pc:spChg chg="add del">
-          <ac:chgData name="Mathias Thomassen" userId="816551f4347a7810" providerId="LiveId" clId="{8116BDB2-3580-4DD9-9925-6D775CA2397B}" dt="2019-03-15T12:11:15.754" v="11"/>
-          <ac:spMkLst>
-            <pc:docMk/>
-            <pc:sldMk cId="1499206831" sldId="257"/>
-            <ac:spMk id="22" creationId="{CB1340FC-C4E2-4CD5-9BCA-7A022E8B4989}"/>
-          </ac:spMkLst>
-        </pc:spChg>
-        <pc:picChg chg="add mod">
-          <ac:chgData name="Mathias Thomassen" userId="816551f4347a7810" providerId="LiveId" clId="{8116BDB2-3580-4DD9-9925-6D775CA2397B}" dt="2019-03-15T12:14:02.462" v="136" actId="14100"/>
-          <ac:picMkLst>
-            <pc:docMk/>
-            <pc:sldMk cId="1499206831" sldId="257"/>
-            <ac:picMk id="1026" creationId="{4F13FAD0-4FE5-484B-88BB-F4E987C128F5}"/>
-          </ac:picMkLst>
-        </pc:picChg>
-        <pc:cxnChg chg="add del">
-          <ac:chgData name="Mathias Thomassen" userId="816551f4347a7810" providerId="LiveId" clId="{8116BDB2-3580-4DD9-9925-6D775CA2397B}" dt="2019-03-15T12:11:15.754" v="11"/>
-          <ac:cxnSpMkLst>
-            <pc:docMk/>
-            <pc:sldMk cId="1499206831" sldId="257"/>
-            <ac:cxnSpMk id="21" creationId="{45B5AFC7-2F07-4F7B-9151-E45D7548D8F3}"/>
-          </ac:cxnSpMkLst>
-        </pc:cxnChg>
-      </pc:sldChg>
-    </pc:docChg>
-  </pc:docChgLst>
   <pc:docChgLst>
     <pc:chgData name="Thomas Møller" userId="ead78d0927e6b416" providerId="LiveId" clId="{8408A93F-7755-464E-AD80-F58061F8CE1F}"/>
     <pc:docChg chg="undo custSel mod addSld modSld">
@@ -502,6 +401,110 @@
       </pc:sldChg>
     </pc:docChg>
   </pc:docChgLst>
+  <pc:docChgLst>
+    <pc:chgData name="Mathias Thomassen" userId="816551f4347a7810" providerId="LiveId" clId="{8116BDB2-3580-4DD9-9925-6D775CA2397B}"/>
+    <pc:docChg chg="undo custSel mod modSld">
+      <pc:chgData name="Mathias Thomassen" userId="816551f4347a7810" providerId="LiveId" clId="{8116BDB2-3580-4DD9-9925-6D775CA2397B}" dt="2019-03-15T12:14:02.462" v="136" actId="14100"/>
+      <pc:docMkLst>
+        <pc:docMk/>
+      </pc:docMkLst>
+      <pc:sldChg chg="addSp delSp modSp delDesignElem">
+        <pc:chgData name="Mathias Thomassen" userId="816551f4347a7810" providerId="LiveId" clId="{8116BDB2-3580-4DD9-9925-6D775CA2397B}" dt="2019-03-15T12:14:02.462" v="136" actId="14100"/>
+        <pc:sldMkLst>
+          <pc:docMk/>
+          <pc:sldMk cId="1499206831" sldId="257"/>
+        </pc:sldMkLst>
+        <pc:spChg chg="add mod">
+          <ac:chgData name="Mathias Thomassen" userId="816551f4347a7810" providerId="LiveId" clId="{8116BDB2-3580-4DD9-9925-6D775CA2397B}" dt="2019-03-15T12:11:15.754" v="11"/>
+          <ac:spMkLst>
+            <pc:docMk/>
+            <pc:sldMk cId="1499206831" sldId="257"/>
+            <ac:spMk id="2" creationId="{47AAE8B5-D27C-44B8-BD49-C9013715E6FF}"/>
+          </ac:spMkLst>
+        </pc:spChg>
+        <pc:spChg chg="del">
+          <ac:chgData name="Mathias Thomassen" userId="816551f4347a7810" providerId="LiveId" clId="{8116BDB2-3580-4DD9-9925-6D775CA2397B}" dt="2019-03-15T12:10:19.578" v="5" actId="478"/>
+          <ac:spMkLst>
+            <pc:docMk/>
+            <pc:sldMk cId="1499206831" sldId="257"/>
+            <ac:spMk id="3" creationId="{70B1838F-B8F4-4254-B75B-C769531CE4F4}"/>
+          </ac:spMkLst>
+        </pc:spChg>
+        <pc:spChg chg="del">
+          <ac:chgData name="Mathias Thomassen" userId="816551f4347a7810" providerId="LiveId" clId="{8116BDB2-3580-4DD9-9925-6D775CA2397B}" dt="2019-03-15T12:09:41.886" v="0"/>
+          <ac:spMkLst>
+            <pc:docMk/>
+            <pc:sldMk cId="1499206831" sldId="257"/>
+            <ac:spMk id="4" creationId="{156718BD-D217-4A13-B0FF-20FCBA09615D}"/>
+          </ac:spMkLst>
+        </pc:spChg>
+        <pc:spChg chg="add mod">
+          <ac:chgData name="Mathias Thomassen" userId="816551f4347a7810" providerId="LiveId" clId="{8116BDB2-3580-4DD9-9925-6D775CA2397B}" dt="2019-03-15T12:11:15.754" v="11"/>
+          <ac:spMkLst>
+            <pc:docMk/>
+            <pc:sldMk cId="1499206831" sldId="257"/>
+            <ac:spMk id="5" creationId="{14F6ACB7-ED3C-415C-9453-255734A04A20}"/>
+          </ac:spMkLst>
+        </pc:spChg>
+        <pc:spChg chg="add mod">
+          <ac:chgData name="Mathias Thomassen" userId="816551f4347a7810" providerId="LiveId" clId="{8116BDB2-3580-4DD9-9925-6D775CA2397B}" dt="2019-03-15T12:11:43.196" v="24" actId="20577"/>
+          <ac:spMkLst>
+            <pc:docMk/>
+            <pc:sldMk cId="1499206831" sldId="257"/>
+            <ac:spMk id="6" creationId="{72B4C361-1205-4DFC-9BC0-ACE4E6F65FEC}"/>
+          </ac:spMkLst>
+        </pc:spChg>
+        <pc:spChg chg="add mod">
+          <ac:chgData name="Mathias Thomassen" userId="816551f4347a7810" providerId="LiveId" clId="{8116BDB2-3580-4DD9-9925-6D775CA2397B}" dt="2019-03-15T12:13:08.019" v="132" actId="2710"/>
+          <ac:spMkLst>
+            <pc:docMk/>
+            <pc:sldMk cId="1499206831" sldId="257"/>
+            <ac:spMk id="7" creationId="{03C4507C-6D0F-4EE4-99AD-6CE4213206BE}"/>
+          </ac:spMkLst>
+        </pc:spChg>
+        <pc:spChg chg="add del">
+          <ac:chgData name="Mathias Thomassen" userId="816551f4347a7810" providerId="LiveId" clId="{8116BDB2-3580-4DD9-9925-6D775CA2397B}" dt="2019-03-15T12:11:15.754" v="11"/>
+          <ac:spMkLst>
+            <pc:docMk/>
+            <pc:sldMk cId="1499206831" sldId="257"/>
+            <ac:spMk id="19" creationId="{D4C3103B-AE2E-41DA-8805-65F1A948FD5A}"/>
+          </ac:spMkLst>
+        </pc:spChg>
+        <pc:spChg chg="add del">
+          <ac:chgData name="Mathias Thomassen" userId="816551f4347a7810" providerId="LiveId" clId="{8116BDB2-3580-4DD9-9925-6D775CA2397B}" dt="2019-03-15T12:11:15.754" v="11"/>
+          <ac:spMkLst>
+            <pc:docMk/>
+            <pc:sldMk cId="1499206831" sldId="257"/>
+            <ac:spMk id="20" creationId="{E3BC0C31-69A7-4200-9AFE-927230E1E04C}"/>
+          </ac:spMkLst>
+        </pc:spChg>
+        <pc:spChg chg="add del">
+          <ac:chgData name="Mathias Thomassen" userId="816551f4347a7810" providerId="LiveId" clId="{8116BDB2-3580-4DD9-9925-6D775CA2397B}" dt="2019-03-15T12:11:15.754" v="11"/>
+          <ac:spMkLst>
+            <pc:docMk/>
+            <pc:sldMk cId="1499206831" sldId="257"/>
+            <ac:spMk id="22" creationId="{CB1340FC-C4E2-4CD5-9BCA-7A022E8B4989}"/>
+          </ac:spMkLst>
+        </pc:spChg>
+        <pc:picChg chg="add mod">
+          <ac:chgData name="Mathias Thomassen" userId="816551f4347a7810" providerId="LiveId" clId="{8116BDB2-3580-4DD9-9925-6D775CA2397B}" dt="2019-03-15T12:14:02.462" v="136" actId="14100"/>
+          <ac:picMkLst>
+            <pc:docMk/>
+            <pc:sldMk cId="1499206831" sldId="257"/>
+            <ac:picMk id="1026" creationId="{4F13FAD0-4FE5-484B-88BB-F4E987C128F5}"/>
+          </ac:picMkLst>
+        </pc:picChg>
+        <pc:cxnChg chg="add del">
+          <ac:chgData name="Mathias Thomassen" userId="816551f4347a7810" providerId="LiveId" clId="{8116BDB2-3580-4DD9-9925-6D775CA2397B}" dt="2019-03-15T12:11:15.754" v="11"/>
+          <ac:cxnSpMkLst>
+            <pc:docMk/>
+            <pc:sldMk cId="1499206831" sldId="257"/>
+            <ac:cxnSpMk id="21" creationId="{45B5AFC7-2F07-4F7B-9151-E45D7548D8F3}"/>
+          </ac:cxnSpMkLst>
+        </pc:cxnChg>
+      </pc:sldChg>
+    </pc:docChg>
+  </pc:docChgLst>
 </pc:chgInfo>
 </file>
 
@@ -587,7 +590,7 @@
           <a:p>
             <a:fld id="{1B93BDC8-39BD-49AC-A78D-09A54DC47AAC}" type="datetimeFigureOut">
               <a:rPr lang="da-DK" smtClean="0"/>
-              <a:t>15-03-2019</a:t>
+              <a:t>18-03-2019</a:t>
             </a:fld>
             <a:endParaRPr lang="da-DK"/>
           </a:p>
@@ -1001,7 +1004,7 @@
           <a:p>
             <a:fld id="{72E0BE3F-CBC6-4067-9C9D-10A068E8322E}" type="datetimeFigureOut">
               <a:rPr lang="da-DK" smtClean="0"/>
-              <a:t>15-03-2019</a:t>
+              <a:t>18-03-2019</a:t>
             </a:fld>
             <a:endParaRPr lang="da-DK"/>
           </a:p>
@@ -1199,7 +1202,7 @@
           <a:p>
             <a:fld id="{72E0BE3F-CBC6-4067-9C9D-10A068E8322E}" type="datetimeFigureOut">
               <a:rPr lang="da-DK" smtClean="0"/>
-              <a:t>15-03-2019</a:t>
+              <a:t>18-03-2019</a:t>
             </a:fld>
             <a:endParaRPr lang="da-DK"/>
           </a:p>
@@ -1407,7 +1410,7 @@
           <a:p>
             <a:fld id="{72E0BE3F-CBC6-4067-9C9D-10A068E8322E}" type="datetimeFigureOut">
               <a:rPr lang="da-DK" smtClean="0"/>
-              <a:t>15-03-2019</a:t>
+              <a:t>18-03-2019</a:t>
             </a:fld>
             <a:endParaRPr lang="da-DK"/>
           </a:p>
@@ -1605,7 +1608,7 @@
           <a:p>
             <a:fld id="{72E0BE3F-CBC6-4067-9C9D-10A068E8322E}" type="datetimeFigureOut">
               <a:rPr lang="da-DK" smtClean="0"/>
-              <a:t>15-03-2019</a:t>
+              <a:t>18-03-2019</a:t>
             </a:fld>
             <a:endParaRPr lang="da-DK"/>
           </a:p>
@@ -1880,7 +1883,7 @@
           <a:p>
             <a:fld id="{72E0BE3F-CBC6-4067-9C9D-10A068E8322E}" type="datetimeFigureOut">
               <a:rPr lang="da-DK" smtClean="0"/>
-              <a:t>15-03-2019</a:t>
+              <a:t>18-03-2019</a:t>
             </a:fld>
             <a:endParaRPr lang="da-DK"/>
           </a:p>
@@ -2145,7 +2148,7 @@
           <a:p>
             <a:fld id="{72E0BE3F-CBC6-4067-9C9D-10A068E8322E}" type="datetimeFigureOut">
               <a:rPr lang="da-DK" smtClean="0"/>
-              <a:t>15-03-2019</a:t>
+              <a:t>18-03-2019</a:t>
             </a:fld>
             <a:endParaRPr lang="da-DK"/>
           </a:p>
@@ -2557,7 +2560,7 @@
           <a:p>
             <a:fld id="{72E0BE3F-CBC6-4067-9C9D-10A068E8322E}" type="datetimeFigureOut">
               <a:rPr lang="da-DK" smtClean="0"/>
-              <a:t>15-03-2019</a:t>
+              <a:t>18-03-2019</a:t>
             </a:fld>
             <a:endParaRPr lang="da-DK"/>
           </a:p>
@@ -2698,7 +2701,7 @@
           <a:p>
             <a:fld id="{72E0BE3F-CBC6-4067-9C9D-10A068E8322E}" type="datetimeFigureOut">
               <a:rPr lang="da-DK" smtClean="0"/>
-              <a:t>15-03-2019</a:t>
+              <a:t>18-03-2019</a:t>
             </a:fld>
             <a:endParaRPr lang="da-DK"/>
           </a:p>
@@ -2811,7 +2814,7 @@
           <a:p>
             <a:fld id="{72E0BE3F-CBC6-4067-9C9D-10A068E8322E}" type="datetimeFigureOut">
               <a:rPr lang="da-DK" smtClean="0"/>
-              <a:t>15-03-2019</a:t>
+              <a:t>18-03-2019</a:t>
             </a:fld>
             <a:endParaRPr lang="da-DK"/>
           </a:p>
@@ -3122,7 +3125,7 @@
           <a:p>
             <a:fld id="{72E0BE3F-CBC6-4067-9C9D-10A068E8322E}" type="datetimeFigureOut">
               <a:rPr lang="da-DK" smtClean="0"/>
-              <a:t>15-03-2019</a:t>
+              <a:t>18-03-2019</a:t>
             </a:fld>
             <a:endParaRPr lang="da-DK"/>
           </a:p>
@@ -3410,7 +3413,7 @@
           <a:p>
             <a:fld id="{72E0BE3F-CBC6-4067-9C9D-10A068E8322E}" type="datetimeFigureOut">
               <a:rPr lang="da-DK" smtClean="0"/>
-              <a:t>15-03-2019</a:t>
+              <a:t>18-03-2019</a:t>
             </a:fld>
             <a:endParaRPr lang="da-DK"/>
           </a:p>
@@ -3651,7 +3654,7 @@
           <a:p>
             <a:fld id="{72E0BE3F-CBC6-4067-9C9D-10A068E8322E}" type="datetimeFigureOut">
               <a:rPr lang="da-DK" smtClean="0"/>
-              <a:t>15-03-2019</a:t>
+              <a:t>18-03-2019</a:t>
             </a:fld>
             <a:endParaRPr lang="da-DK"/>
           </a:p>
@@ -4930,12 +4933,179 @@
           <a:chExt cx="0" cy="0"/>
         </a:xfrm>
       </p:grpSpPr>
+      <p:sp>
+        <p:nvSpPr>
+          <p:cNvPr id="2" name="Titel 1">
+            <a:extLst>
+              <a:ext uri="{FF2B5EF4-FFF2-40B4-BE49-F238E27FC236}">
+                <a16:creationId xmlns:a16="http://schemas.microsoft.com/office/drawing/2014/main" id="{4C3382AB-BD7D-4C37-AB3F-A365DB9B78F5}"/>
+              </a:ext>
+            </a:extLst>
+          </p:cNvPr>
+          <p:cNvSpPr>
+            <a:spLocks noGrp="1"/>
+          </p:cNvSpPr>
+          <p:nvPr>
+            <p:ph type="title"/>
+          </p:nvPr>
+        </p:nvSpPr>
+        <p:spPr/>
+        <p:txBody>
+          <a:bodyPr/>
+          <a:lstStyle/>
+          <a:p>
+            <a:r>
+              <a:rPr lang="da-DK" dirty="0"/>
+              <a:t>Krav</a:t>
+            </a:r>
+          </a:p>
+        </p:txBody>
+      </p:sp>
+      <p:sp>
+        <p:nvSpPr>
+          <p:cNvPr id="3" name="Pladsholder til indhold 2">
+            <a:extLst>
+              <a:ext uri="{FF2B5EF4-FFF2-40B4-BE49-F238E27FC236}">
+                <a16:creationId xmlns:a16="http://schemas.microsoft.com/office/drawing/2014/main" id="{2A881AE0-004F-4313-B092-522BDB12A3F9}"/>
+              </a:ext>
+            </a:extLst>
+          </p:cNvPr>
+          <p:cNvSpPr>
+            <a:spLocks noGrp="1"/>
+          </p:cNvSpPr>
+          <p:nvPr>
+            <p:ph idx="1"/>
+          </p:nvPr>
+        </p:nvSpPr>
+        <p:spPr/>
+        <p:txBody>
+          <a:bodyPr/>
+          <a:lstStyle/>
+          <a:p>
+            <a:endParaRPr lang="da-DK" dirty="0"/>
+          </a:p>
+        </p:txBody>
+      </p:sp>
+      <p:sp>
+        <p:nvSpPr>
+          <p:cNvPr id="4" name="Pladsholder til tekst 3">
+            <a:extLst>
+              <a:ext uri="{FF2B5EF4-FFF2-40B4-BE49-F238E27FC236}">
+                <a16:creationId xmlns:a16="http://schemas.microsoft.com/office/drawing/2014/main" id="{BAB46E7B-2003-41AC-ADF2-CB1C7EC0B9A7}"/>
+              </a:ext>
+            </a:extLst>
+          </p:cNvPr>
+          <p:cNvSpPr>
+            <a:spLocks noGrp="1"/>
+          </p:cNvSpPr>
+          <p:nvPr>
+            <p:ph type="body" sz="half" idx="2"/>
+          </p:nvPr>
+        </p:nvSpPr>
+        <p:spPr/>
+        <p:txBody>
+          <a:bodyPr/>
+          <a:lstStyle/>
+          <a:p>
+            <a:r>
+              <a:rPr lang="da-DK" dirty="0"/>
+              <a:t>Funktionelle</a:t>
+            </a:r>
+          </a:p>
+          <a:p>
+            <a:pPr marL="285750" indent="-285750">
+              <a:buFont typeface="Arial" panose="020B0604020202020204" pitchFamily="34" charset="0"/>
+              <a:buChar char="•"/>
+            </a:pPr>
+            <a:r>
+              <a:rPr lang="da-DK" dirty="0"/>
+              <a:t>Skal kunne tilføje personer og holde styr på gæld for disse personer</a:t>
+            </a:r>
+          </a:p>
+          <a:p>
+            <a:r>
+              <a:rPr lang="da-DK" dirty="0"/>
+              <a:t>Ikke funktionelle:</a:t>
+            </a:r>
+          </a:p>
+          <a:p>
+            <a:pPr marL="285750" indent="-285750">
+              <a:buFont typeface="Arial" panose="020B0604020202020204" pitchFamily="34" charset="0"/>
+              <a:buChar char="•"/>
+            </a:pPr>
+            <a:r>
+              <a:rPr lang="da-DK" dirty="0"/>
+              <a:t>Data skal verificeres</a:t>
+            </a:r>
+          </a:p>
+          <a:p>
+            <a:pPr marL="285750" indent="-285750">
+              <a:buFont typeface="Arial" panose="020B0604020202020204" pitchFamily="34" charset="0"/>
+              <a:buChar char="•"/>
+            </a:pPr>
+            <a:r>
+              <a:rPr lang="da-DK" dirty="0"/>
+              <a:t>Programmet skal ikke crashe ved forkert indtastet data.</a:t>
+            </a:r>
+          </a:p>
+          <a:p>
+            <a:pPr marL="285750" indent="-285750">
+              <a:buFont typeface="Arial" panose="020B0604020202020204" pitchFamily="34" charset="0"/>
+              <a:buChar char="•"/>
+            </a:pPr>
+            <a:r>
+              <a:rPr lang="da-DK" dirty="0"/>
+              <a:t>Programmet skal opdatere data i alle views</a:t>
+            </a:r>
+          </a:p>
+          <a:p>
+            <a:pPr marL="285750" indent="-285750">
+              <a:buFont typeface="Arial" panose="020B0604020202020204" pitchFamily="34" charset="0"/>
+              <a:buChar char="•"/>
+            </a:pPr>
+            <a:endParaRPr lang="da-DK" dirty="0"/>
+          </a:p>
+          <a:p>
+            <a:endParaRPr lang="da-DK" dirty="0"/>
+          </a:p>
+        </p:txBody>
+      </p:sp>
+    </p:spTree>
+    <p:extLst>
+      <p:ext uri="{BB962C8B-B14F-4D97-AF65-F5344CB8AC3E}">
+        <p14:creationId xmlns:p14="http://schemas.microsoft.com/office/powerpoint/2010/main" val="3314235661"/>
+      </p:ext>
+    </p:extLst>
+  </p:cSld>
+  <p:clrMapOvr>
+    <a:masterClrMapping/>
+  </p:clrMapOvr>
+</p:sld>
+</file>
+
+<file path=ppt/slides/slide4.xml><?xml version="1.0" encoding="utf-8"?>
+<p:sld xmlns:a="http://schemas.openxmlformats.org/drawingml/2006/main" xmlns:r="http://schemas.openxmlformats.org/officeDocument/2006/relationships" xmlns:p="http://schemas.openxmlformats.org/presentationml/2006/main">
+  <p:cSld>
+    <p:spTree>
+      <p:nvGrpSpPr>
+        <p:cNvPr id="1" name=""/>
+        <p:cNvGrpSpPr/>
+        <p:nvPr/>
+      </p:nvGrpSpPr>
+      <p:grpSpPr>
+        <a:xfrm>
+          <a:off x="0" y="0"/>
+          <a:ext cx="0" cy="0"/>
+          <a:chOff x="0" y="0"/>
+          <a:chExt cx="0" cy="0"/>
+        </a:xfrm>
+      </p:grpSpPr>
       <p:pic>
         <p:nvPicPr>
-          <p:cNvPr id="7" name="Billede 6">
-            <a:extLst>
-              <a:ext uri="{FF2B5EF4-FFF2-40B4-BE49-F238E27FC236}">
-                <a16:creationId xmlns:a16="http://schemas.microsoft.com/office/drawing/2014/main" id="{F603BD0B-7BF5-48A5-91B5-96B8A7161FD8}"/>
+          <p:cNvPr id="2" name="Billede 1">
+            <a:extLst>
+              <a:ext uri="{FF2B5EF4-FFF2-40B4-BE49-F238E27FC236}">
+                <a16:creationId xmlns:a16="http://schemas.microsoft.com/office/drawing/2014/main" id="{A34B52E5-913A-4AE4-8906-ACB2BCE37D6F}"/>
               </a:ext>
             </a:extLst>
           </p:cNvPr>
@@ -4952,8 +5122,8 @@
         </p:blipFill>
         <p:spPr>
           <a:xfrm>
-            <a:off x="2135223" y="711200"/>
-            <a:ext cx="7921553" cy="5781675"/>
+            <a:off x="2990400" y="549606"/>
+            <a:ext cx="8424754" cy="5758788"/>
           </a:xfrm>
           <a:prstGeom prst="rect">
             <a:avLst/>
@@ -4988,6 +5158,36 @@
           </a:p>
         </p:txBody>
       </p:sp>
+      <p:pic>
+        <p:nvPicPr>
+          <p:cNvPr id="3" name="Billede 2">
+            <a:extLst>
+              <a:ext uri="{FF2B5EF4-FFF2-40B4-BE49-F238E27FC236}">
+                <a16:creationId xmlns:a16="http://schemas.microsoft.com/office/drawing/2014/main" id="{FED43B8A-C61C-4656-8000-4CB331AD1A3E}"/>
+              </a:ext>
+            </a:extLst>
+          </p:cNvPr>
+          <p:cNvPicPr>
+            <a:picLocks noChangeAspect="1"/>
+          </p:cNvPicPr>
+          <p:nvPr/>
+        </p:nvPicPr>
+        <p:blipFill>
+          <a:blip r:embed="rId3"/>
+          <a:stretch>
+            <a:fillRect/>
+          </a:stretch>
+        </p:blipFill>
+        <p:spPr>
+          <a:xfrm>
+            <a:off x="1145921" y="1611064"/>
+            <a:ext cx="1771650" cy="4667250"/>
+          </a:xfrm>
+          <a:prstGeom prst="rect">
+            <a:avLst/>
+          </a:prstGeom>
+        </p:spPr>
+      </p:pic>
     </p:spTree>
     <p:extLst>
       <p:ext uri="{BB962C8B-B14F-4D97-AF65-F5344CB8AC3E}">
@@ -5001,7 +5201,236 @@
 </p:sld>
 </file>
 
-<file path=ppt/slides/slide4.xml><?xml version="1.0" encoding="utf-8"?>
+<file path=ppt/slides/slide5.xml><?xml version="1.0" encoding="utf-8"?>
+<p:sld xmlns:a="http://schemas.openxmlformats.org/drawingml/2006/main" xmlns:r="http://schemas.openxmlformats.org/officeDocument/2006/relationships" xmlns:p="http://schemas.openxmlformats.org/presentationml/2006/main">
+  <p:cSld>
+    <p:bg>
+      <p:bgPr>
+        <a:solidFill>
+          <a:schemeClr val="bg1"/>
+        </a:solidFill>
+        <a:effectLst/>
+      </p:bgPr>
+    </p:bg>
+    <p:spTree>
+      <p:nvGrpSpPr>
+        <p:cNvPr id="1" name=""/>
+        <p:cNvGrpSpPr/>
+        <p:nvPr/>
+      </p:nvGrpSpPr>
+      <p:grpSpPr>
+        <a:xfrm>
+          <a:off x="0" y="0"/>
+          <a:ext cx="0" cy="0"/>
+          <a:chOff x="0" y="0"/>
+          <a:chExt cx="0" cy="0"/>
+        </a:xfrm>
+      </p:grpSpPr>
+      <p:sp>
+        <p:nvSpPr>
+          <p:cNvPr id="2" name="Titel 1">
+            <a:extLst>
+              <a:ext uri="{FF2B5EF4-FFF2-40B4-BE49-F238E27FC236}">
+                <a16:creationId xmlns:a16="http://schemas.microsoft.com/office/drawing/2014/main" id="{C298120D-2EE8-48F6-B6C5-C502B461B114}"/>
+              </a:ext>
+            </a:extLst>
+          </p:cNvPr>
+          <p:cNvSpPr>
+            <a:spLocks noGrp="1"/>
+          </p:cNvSpPr>
+          <p:nvPr>
+            <p:ph type="title"/>
+          </p:nvPr>
+        </p:nvSpPr>
+        <p:spPr>
+          <a:xfrm>
+            <a:off x="642996" y="4571216"/>
+            <a:ext cx="10906008" cy="1115415"/>
+          </a:xfrm>
+        </p:spPr>
+        <p:txBody>
+          <a:bodyPr vert="horz" lIns="91440" tIns="45720" rIns="91440" bIns="45720" rtlCol="0" anchor="b">
+            <a:normAutofit/>
+          </a:bodyPr>
+          <a:lstStyle/>
+          <a:p>
+            <a:pPr algn="ctr"/>
+            <a:r>
+              <a:rPr lang="en-US" sz="4000" dirty="0"/>
+              <a:t>Databinding </a:t>
+            </a:r>
+            <a:r>
+              <a:rPr lang="en-US" sz="4000" dirty="0" err="1"/>
+              <a:t>i</a:t>
+            </a:r>
+            <a:r>
+              <a:rPr lang="en-US" sz="4000" dirty="0"/>
+              <a:t> </a:t>
+            </a:r>
+            <a:r>
+              <a:rPr lang="en-US" sz="4000" dirty="0" err="1"/>
+              <a:t>kode</a:t>
+            </a:r>
+            <a:endParaRPr lang="en-US" sz="4000" dirty="0"/>
+          </a:p>
+        </p:txBody>
+      </p:sp>
+      <p:pic>
+        <p:nvPicPr>
+          <p:cNvPr id="3" name="Billede 2">
+            <a:extLst>
+              <a:ext uri="{FF2B5EF4-FFF2-40B4-BE49-F238E27FC236}">
+                <a16:creationId xmlns:a16="http://schemas.microsoft.com/office/drawing/2014/main" id="{F9F860FD-184A-4C97-96E1-241B43AE5E79}"/>
+              </a:ext>
+            </a:extLst>
+          </p:cNvPr>
+          <p:cNvPicPr>
+            <a:picLocks noChangeAspect="1"/>
+          </p:cNvPicPr>
+          <p:nvPr/>
+        </p:nvPicPr>
+        <p:blipFill>
+          <a:blip r:embed="rId2"/>
+          <a:stretch>
+            <a:fillRect/>
+          </a:stretch>
+        </p:blipFill>
+        <p:spPr>
+          <a:xfrm>
+            <a:off x="8369352" y="1552840"/>
+            <a:ext cx="3763284" cy="2192113"/>
+          </a:xfrm>
+          <a:prstGeom prst="rect">
+            <a:avLst/>
+          </a:prstGeom>
+        </p:spPr>
+      </p:pic>
+      <p:pic>
+        <p:nvPicPr>
+          <p:cNvPr id="5" name="Billede 4">
+            <a:extLst>
+              <a:ext uri="{FF2B5EF4-FFF2-40B4-BE49-F238E27FC236}">
+                <a16:creationId xmlns:a16="http://schemas.microsoft.com/office/drawing/2014/main" id="{376A1021-7C86-4ED1-8029-BEBD327082FC}"/>
+              </a:ext>
+            </a:extLst>
+          </p:cNvPr>
+          <p:cNvPicPr>
+            <a:picLocks noChangeAspect="1"/>
+          </p:cNvPicPr>
+          <p:nvPr/>
+        </p:nvPicPr>
+        <p:blipFill>
+          <a:blip r:embed="rId3"/>
+          <a:stretch>
+            <a:fillRect/>
+          </a:stretch>
+        </p:blipFill>
+        <p:spPr>
+          <a:xfrm>
+            <a:off x="351914" y="793854"/>
+            <a:ext cx="3763284" cy="3406063"/>
+          </a:xfrm>
+          <a:prstGeom prst="rect">
+            <a:avLst/>
+          </a:prstGeom>
+        </p:spPr>
+      </p:pic>
+      <p:pic>
+        <p:nvPicPr>
+          <p:cNvPr id="4" name="Billede 3">
+            <a:extLst>
+              <a:ext uri="{FF2B5EF4-FFF2-40B4-BE49-F238E27FC236}">
+                <a16:creationId xmlns:a16="http://schemas.microsoft.com/office/drawing/2014/main" id="{B75DA95D-D444-40A0-85E8-2C2615C44409}"/>
+              </a:ext>
+            </a:extLst>
+          </p:cNvPr>
+          <p:cNvPicPr>
+            <a:picLocks noChangeAspect="1"/>
+          </p:cNvPicPr>
+          <p:nvPr/>
+        </p:nvPicPr>
+        <p:blipFill>
+          <a:blip r:embed="rId4"/>
+          <a:stretch>
+            <a:fillRect/>
+          </a:stretch>
+        </p:blipFill>
+        <p:spPr>
+          <a:xfrm>
+            <a:off x="4407746" y="1896842"/>
+            <a:ext cx="3669058" cy="1021849"/>
+          </a:xfrm>
+          <a:prstGeom prst="rect">
+            <a:avLst/>
+          </a:prstGeom>
+        </p:spPr>
+      </p:pic>
+      <p:cxnSp>
+        <p:nvCxnSpPr>
+          <p:cNvPr id="10" name="Straight Connector 9">
+            <a:extLst>
+              <a:ext uri="{FF2B5EF4-FFF2-40B4-BE49-F238E27FC236}">
+                <a16:creationId xmlns:a16="http://schemas.microsoft.com/office/drawing/2014/main" id="{8F880EF2-DF79-4D9D-8F11-E91D48C79741}"/>
+              </a:ext>
+              <a:ext uri="{C183D7F6-B498-43B3-948B-1728B52AA6E4}">
+                <adec:decorative xmlns:adec="http://schemas.microsoft.com/office/drawing/2017/decorative" val="1"/>
+              </a:ext>
+            </a:extLst>
+          </p:cNvPr>
+          <p:cNvCxnSpPr>
+            <a:cxnSpLocks noGrp="1" noRot="1" noChangeAspect="1" noMove="1" noResize="1" noEditPoints="1" noAdjustHandles="1" noChangeArrowheads="1" noChangeShapeType="1"/>
+          </p:cNvCxnSpPr>
+          <p:nvPr>
+            <p:extLst>
+              <p:ext uri="{386F3935-93C4-4BCD-93E2-E3B085C9AB24}">
+                <p16:designElem xmlns:p16="http://schemas.microsoft.com/office/powerpoint/2015/main" val="1"/>
+              </p:ext>
+            </p:extLst>
+          </p:nvPr>
+        </p:nvCxnSpPr>
+        <p:spPr>
+          <a:xfrm>
+            <a:off x="1524000" y="5778706"/>
+            <a:ext cx="9144000" cy="0"/>
+          </a:xfrm>
+          <a:prstGeom prst="line">
+            <a:avLst/>
+          </a:prstGeom>
+          <a:ln w="19050">
+            <a:solidFill>
+              <a:srgbClr val="D68723"/>
+            </a:solidFill>
+          </a:ln>
+        </p:spPr>
+        <p:style>
+          <a:lnRef idx="1">
+            <a:schemeClr val="accent1"/>
+          </a:lnRef>
+          <a:fillRef idx="0">
+            <a:schemeClr val="accent1"/>
+          </a:fillRef>
+          <a:effectRef idx="0">
+            <a:schemeClr val="accent1"/>
+          </a:effectRef>
+          <a:fontRef idx="minor">
+            <a:schemeClr val="tx1"/>
+          </a:fontRef>
+        </p:style>
+      </p:cxnSp>
+    </p:spTree>
+    <p:extLst>
+      <p:ext uri="{BB962C8B-B14F-4D97-AF65-F5344CB8AC3E}">
+        <p14:creationId xmlns:p14="http://schemas.microsoft.com/office/powerpoint/2010/main" val="1657495119"/>
+      </p:ext>
+    </p:extLst>
+  </p:cSld>
+  <p:clrMapOvr>
+    <a:masterClrMapping/>
+  </p:clrMapOvr>
+</p:sld>
+</file>
+
+<file path=ppt/slides/slide6.xml><?xml version="1.0" encoding="utf-8"?>
 <p:sld xmlns:a="http://schemas.openxmlformats.org/drawingml/2006/main" xmlns:r="http://schemas.openxmlformats.org/officeDocument/2006/relationships" xmlns:p="http://schemas.openxmlformats.org/presentationml/2006/main">
   <p:cSld>
     <p:spTree>
@@ -5090,6 +5519,620 @@
   </p:cSld>
   <p:clrMapOvr>
     <a:masterClrMapping/>
+  </p:clrMapOvr>
+</p:sld>
+</file>
+
+<file path=ppt/slides/slide7.xml><?xml version="1.0" encoding="utf-8"?>
+<p:sld xmlns:a="http://schemas.openxmlformats.org/drawingml/2006/main" xmlns:r="http://schemas.openxmlformats.org/officeDocument/2006/relationships" xmlns:p="http://schemas.openxmlformats.org/presentationml/2006/main">
+  <p:cSld>
+    <p:bg>
+      <p:bgPr>
+        <a:solidFill>
+          <a:schemeClr val="bg1">
+            <a:tint val="95000"/>
+            <a:satMod val="170000"/>
+          </a:schemeClr>
+        </a:solidFill>
+        <a:effectLst/>
+      </p:bgPr>
+    </p:bg>
+    <p:spTree>
+      <p:nvGrpSpPr>
+        <p:cNvPr id="1" name=""/>
+        <p:cNvGrpSpPr/>
+        <p:nvPr/>
+      </p:nvGrpSpPr>
+      <p:grpSpPr>
+        <a:xfrm>
+          <a:off x="0" y="0"/>
+          <a:ext cx="0" cy="0"/>
+          <a:chOff x="0" y="0"/>
+          <a:chExt cx="0" cy="0"/>
+        </a:xfrm>
+      </p:grpSpPr>
+      <p:sp>
+        <p:nvSpPr>
+          <p:cNvPr id="2" name="Titel 1">
+            <a:extLst>
+              <a:ext uri="{FF2B5EF4-FFF2-40B4-BE49-F238E27FC236}">
+                <a16:creationId xmlns:a16="http://schemas.microsoft.com/office/drawing/2014/main" id="{3568C3D1-B619-4886-BE43-522B11FD4508}"/>
+              </a:ext>
+            </a:extLst>
+          </p:cNvPr>
+          <p:cNvSpPr>
+            <a:spLocks noGrp="1"/>
+          </p:cNvSpPr>
+          <p:nvPr>
+            <p:ph type="title"/>
+          </p:nvPr>
+        </p:nvSpPr>
+        <p:spPr>
+          <a:xfrm>
+            <a:off x="8957300" y="1162787"/>
+            <a:ext cx="2595506" cy="2869717"/>
+          </a:xfrm>
+        </p:spPr>
+        <p:txBody>
+          <a:bodyPr vert="horz" lIns="91440" tIns="45720" rIns="91440" bIns="45720" rtlCol="0" anchor="b">
+            <a:normAutofit/>
+          </a:bodyPr>
+          <a:lstStyle/>
+          <a:p>
+            <a:r>
+              <a:rPr lang="en-US" sz="4800" dirty="0"/>
+              <a:t>Design </a:t>
+            </a:r>
+          </a:p>
+        </p:txBody>
+      </p:sp>
+      <p:sp>
+        <p:nvSpPr>
+          <p:cNvPr id="11" name="Rectangle 10">
+            <a:extLst>
+              <a:ext uri="{FF2B5EF4-FFF2-40B4-BE49-F238E27FC236}">
+                <a16:creationId xmlns:a16="http://schemas.microsoft.com/office/drawing/2014/main" id="{6AF87FB0-CB93-4F72-9279-BC4CE90B310E}"/>
+              </a:ext>
+              <a:ext uri="{C183D7F6-B498-43B3-948B-1728B52AA6E4}">
+                <adec:decorative xmlns:adec="http://schemas.microsoft.com/office/drawing/2017/decorative" val="1"/>
+              </a:ext>
+            </a:extLst>
+          </p:cNvPr>
+          <p:cNvSpPr>
+            <a:spLocks noGrp="1" noRot="1" noChangeAspect="1" noMove="1" noResize="1" noEditPoints="1" noAdjustHandles="1" noChangeArrowheads="1" noChangeShapeType="1" noTextEdit="1"/>
+          </p:cNvSpPr>
+          <p:nvPr>
+            <p:extLst>
+              <p:ext uri="{386F3935-93C4-4BCD-93E2-E3B085C9AB24}">
+                <p16:designElem xmlns:p16="http://schemas.microsoft.com/office/powerpoint/2015/main" val="1"/>
+              </p:ext>
+            </p:extLst>
+          </p:nvPr>
+        </p:nvSpPr>
+        <p:spPr>
+          <a:xfrm>
+            <a:off x="0" y="0"/>
+            <a:ext cx="7653591" cy="6858000"/>
+          </a:xfrm>
+          <a:prstGeom prst="rect">
+            <a:avLst/>
+          </a:prstGeom>
+          <a:solidFill>
+            <a:srgbClr val="FFFFFF">
+              <a:alpha val="80000"/>
+            </a:srgbClr>
+          </a:solidFill>
+          <a:ln>
+            <a:noFill/>
+          </a:ln>
+        </p:spPr>
+        <p:style>
+          <a:lnRef idx="2">
+            <a:schemeClr val="accent1">
+              <a:shade val="50000"/>
+            </a:schemeClr>
+          </a:lnRef>
+          <a:fillRef idx="1">
+            <a:schemeClr val="accent1"/>
+          </a:fillRef>
+          <a:effectRef idx="0">
+            <a:schemeClr val="accent1"/>
+          </a:effectRef>
+          <a:fontRef idx="minor">
+            <a:schemeClr val="lt1"/>
+          </a:fontRef>
+        </p:style>
+        <p:txBody>
+          <a:bodyPr rtlCol="0" anchor="ctr"/>
+          <a:lstStyle/>
+          <a:p>
+            <a:pPr marL="0" marR="0" lvl="0" indent="0" algn="ctr" defTabSz="914400" rtl="0" eaLnBrk="1" fontAlgn="auto" latinLnBrk="0" hangingPunct="1">
+              <a:lnSpc>
+                <a:spcPct val="100000"/>
+              </a:lnSpc>
+              <a:spcBef>
+                <a:spcPts val="0"/>
+              </a:spcBef>
+              <a:spcAft>
+                <a:spcPts val="0"/>
+              </a:spcAft>
+              <a:buClrTx/>
+              <a:buSzTx/>
+              <a:buFontTx/>
+              <a:buNone/>
+              <a:tabLst/>
+              <a:defRPr/>
+            </a:pPr>
+            <a:endParaRPr kumimoji="0" lang="en-US" sz="1800" b="0" i="0" u="none" strike="noStrike" kern="1200" cap="none" spc="0" normalizeH="0" baseline="0" noProof="0" dirty="0">
+              <a:ln>
+                <a:noFill/>
+              </a:ln>
+              <a:solidFill>
+                <a:prstClr val="white"/>
+              </a:solidFill>
+              <a:effectLst/>
+              <a:uLnTx/>
+              <a:uFillTx/>
+              <a:latin typeface="Calibri" panose="020F0502020204030204"/>
+              <a:ea typeface="+mn-ea"/>
+              <a:cs typeface="+mn-cs"/>
+            </a:endParaRPr>
+          </a:p>
+        </p:txBody>
+      </p:sp>
+      <p:sp>
+        <p:nvSpPr>
+          <p:cNvPr id="13" name="Rectangle 12">
+            <a:extLst>
+              <a:ext uri="{FF2B5EF4-FFF2-40B4-BE49-F238E27FC236}">
+                <a16:creationId xmlns:a16="http://schemas.microsoft.com/office/drawing/2014/main" id="{5E139927-0A6F-4AD3-91D3-B2A9E671595B}"/>
+              </a:ext>
+              <a:ext uri="{C183D7F6-B498-43B3-948B-1728B52AA6E4}">
+                <adec:decorative xmlns:adec="http://schemas.microsoft.com/office/drawing/2017/decorative" val="1"/>
+              </a:ext>
+            </a:extLst>
+          </p:cNvPr>
+          <p:cNvSpPr>
+            <a:spLocks noGrp="1" noRot="1" noChangeAspect="1" noMove="1" noResize="1" noEditPoints="1" noAdjustHandles="1" noChangeArrowheads="1" noChangeShapeType="1" noTextEdit="1"/>
+          </p:cNvSpPr>
+          <p:nvPr>
+            <p:extLst>
+              <p:ext uri="{386F3935-93C4-4BCD-93E2-E3B085C9AB24}">
+                <p16:designElem xmlns:p16="http://schemas.microsoft.com/office/powerpoint/2015/main" val="1"/>
+              </p:ext>
+            </p:extLst>
+          </p:nvPr>
+        </p:nvSpPr>
+        <p:spPr>
+          <a:xfrm>
+            <a:off x="321732" y="321732"/>
+            <a:ext cx="4111054" cy="3674848"/>
+          </a:xfrm>
+          <a:prstGeom prst="rect">
+            <a:avLst/>
+          </a:prstGeom>
+          <a:solidFill>
+            <a:srgbClr val="FFFFFF"/>
+          </a:solidFill>
+          <a:ln w="15875" cap="sq">
+            <a:noFill/>
+            <a:miter lim="800000"/>
+          </a:ln>
+        </p:spPr>
+        <p:style>
+          <a:lnRef idx="2">
+            <a:schemeClr val="accent1">
+              <a:shade val="50000"/>
+            </a:schemeClr>
+          </a:lnRef>
+          <a:fillRef idx="1">
+            <a:schemeClr val="accent1"/>
+          </a:fillRef>
+          <a:effectRef idx="0">
+            <a:schemeClr val="accent1"/>
+          </a:effectRef>
+          <a:fontRef idx="minor">
+            <a:schemeClr val="lt1"/>
+          </a:fontRef>
+        </p:style>
+        <p:txBody>
+          <a:bodyPr rtlCol="0" anchor="ctr"/>
+          <a:lstStyle/>
+          <a:p>
+            <a:pPr marL="0" marR="0" lvl="0" indent="0" algn="ctr" defTabSz="914400" rtl="0" eaLnBrk="1" fontAlgn="auto" latinLnBrk="0" hangingPunct="1">
+              <a:lnSpc>
+                <a:spcPct val="100000"/>
+              </a:lnSpc>
+              <a:spcBef>
+                <a:spcPts val="0"/>
+              </a:spcBef>
+              <a:spcAft>
+                <a:spcPts val="0"/>
+              </a:spcAft>
+              <a:buClrTx/>
+              <a:buSzTx/>
+              <a:buFontTx/>
+              <a:buNone/>
+              <a:tabLst/>
+              <a:defRPr/>
+            </a:pPr>
+            <a:endParaRPr kumimoji="0" lang="en-US" sz="1800" b="0" i="0" u="none" strike="noStrike" kern="1200" cap="none" spc="0" normalizeH="0" baseline="0" noProof="0">
+              <a:ln>
+                <a:noFill/>
+              </a:ln>
+              <a:solidFill>
+                <a:prstClr val="white"/>
+              </a:solidFill>
+              <a:effectLst/>
+              <a:uLnTx/>
+              <a:uFillTx/>
+              <a:latin typeface="Calibri" panose="020F0502020204030204"/>
+              <a:ea typeface="+mn-ea"/>
+              <a:cs typeface="+mn-cs"/>
+            </a:endParaRPr>
+          </a:p>
+        </p:txBody>
+      </p:sp>
+      <p:pic>
+        <p:nvPicPr>
+          <p:cNvPr id="3" name="Billede 2">
+            <a:extLst>
+              <a:ext uri="{FF2B5EF4-FFF2-40B4-BE49-F238E27FC236}">
+                <a16:creationId xmlns:a16="http://schemas.microsoft.com/office/drawing/2014/main" id="{FD3D5D0E-E22A-4FE0-B18F-668ADBC0D7EC}"/>
+              </a:ext>
+            </a:extLst>
+          </p:cNvPr>
+          <p:cNvPicPr>
+            <a:picLocks noChangeAspect="1"/>
+          </p:cNvPicPr>
+          <p:nvPr/>
+        </p:nvPicPr>
+        <p:blipFill>
+          <a:blip r:embed="rId2"/>
+          <a:stretch>
+            <a:fillRect/>
+          </a:stretch>
+        </p:blipFill>
+        <p:spPr>
+          <a:xfrm>
+            <a:off x="376965" y="1025236"/>
+            <a:ext cx="4000588" cy="2484195"/>
+          </a:xfrm>
+          <a:prstGeom prst="rect">
+            <a:avLst/>
+          </a:prstGeom>
+        </p:spPr>
+      </p:pic>
+      <p:sp>
+        <p:nvSpPr>
+          <p:cNvPr id="15" name="Rectangle 14">
+            <a:extLst>
+              <a:ext uri="{FF2B5EF4-FFF2-40B4-BE49-F238E27FC236}">
+                <a16:creationId xmlns:a16="http://schemas.microsoft.com/office/drawing/2014/main" id="{5EADE63F-FE89-4F18-B3CE-624078B381F4}"/>
+              </a:ext>
+              <a:ext uri="{C183D7F6-B498-43B3-948B-1728B52AA6E4}">
+                <adec:decorative xmlns:adec="http://schemas.microsoft.com/office/drawing/2017/decorative" val="1"/>
+              </a:ext>
+            </a:extLst>
+          </p:cNvPr>
+          <p:cNvSpPr>
+            <a:spLocks noGrp="1" noRot="1" noChangeAspect="1" noMove="1" noResize="1" noEditPoints="1" noAdjustHandles="1" noChangeArrowheads="1" noChangeShapeType="1" noTextEdit="1"/>
+          </p:cNvSpPr>
+          <p:nvPr>
+            <p:extLst>
+              <p:ext uri="{386F3935-93C4-4BCD-93E2-E3B085C9AB24}">
+                <p16:designElem xmlns:p16="http://schemas.microsoft.com/office/powerpoint/2015/main" val="1"/>
+              </p:ext>
+            </p:extLst>
+          </p:nvPr>
+        </p:nvSpPr>
+        <p:spPr>
+          <a:xfrm>
+            <a:off x="4579747" y="321732"/>
+            <a:ext cx="2766017" cy="3026832"/>
+          </a:xfrm>
+          <a:prstGeom prst="rect">
+            <a:avLst/>
+          </a:prstGeom>
+          <a:solidFill>
+            <a:srgbClr val="FFFFFF"/>
+          </a:solidFill>
+          <a:ln w="15875" cap="sq">
+            <a:noFill/>
+            <a:miter lim="800000"/>
+          </a:ln>
+        </p:spPr>
+        <p:style>
+          <a:lnRef idx="2">
+            <a:schemeClr val="accent1">
+              <a:shade val="50000"/>
+            </a:schemeClr>
+          </a:lnRef>
+          <a:fillRef idx="1">
+            <a:schemeClr val="accent1"/>
+          </a:fillRef>
+          <a:effectRef idx="0">
+            <a:schemeClr val="accent1"/>
+          </a:effectRef>
+          <a:fontRef idx="minor">
+            <a:schemeClr val="lt1"/>
+          </a:fontRef>
+        </p:style>
+        <p:txBody>
+          <a:bodyPr rtlCol="0" anchor="ctr"/>
+          <a:lstStyle/>
+          <a:p>
+            <a:pPr marL="0" marR="0" lvl="0" indent="0" algn="ctr" defTabSz="914400" rtl="0" eaLnBrk="1" fontAlgn="auto" latinLnBrk="0" hangingPunct="1">
+              <a:lnSpc>
+                <a:spcPct val="100000"/>
+              </a:lnSpc>
+              <a:spcBef>
+                <a:spcPts val="0"/>
+              </a:spcBef>
+              <a:spcAft>
+                <a:spcPts val="0"/>
+              </a:spcAft>
+              <a:buClrTx/>
+              <a:buSzTx/>
+              <a:buFontTx/>
+              <a:buNone/>
+              <a:tabLst/>
+              <a:defRPr/>
+            </a:pPr>
+            <a:endParaRPr kumimoji="0" lang="en-US" sz="1800" b="0" i="0" u="none" strike="noStrike" kern="1200" cap="none" spc="0" normalizeH="0" baseline="0" noProof="0">
+              <a:ln>
+                <a:noFill/>
+              </a:ln>
+              <a:solidFill>
+                <a:prstClr val="white"/>
+              </a:solidFill>
+              <a:effectLst/>
+              <a:uLnTx/>
+              <a:uFillTx/>
+              <a:latin typeface="Calibri" panose="020F0502020204030204"/>
+              <a:ea typeface="+mn-ea"/>
+              <a:cs typeface="+mn-cs"/>
+            </a:endParaRPr>
+          </a:p>
+        </p:txBody>
+      </p:sp>
+      <p:pic>
+        <p:nvPicPr>
+          <p:cNvPr id="5" name="Billede 4">
+            <a:extLst>
+              <a:ext uri="{FF2B5EF4-FFF2-40B4-BE49-F238E27FC236}">
+                <a16:creationId xmlns:a16="http://schemas.microsoft.com/office/drawing/2014/main" id="{75E6799E-69CD-475D-B31D-40FAE77F2D94}"/>
+              </a:ext>
+            </a:extLst>
+          </p:cNvPr>
+          <p:cNvPicPr>
+            <a:picLocks noChangeAspect="1"/>
+          </p:cNvPicPr>
+          <p:nvPr/>
+        </p:nvPicPr>
+        <p:blipFill>
+          <a:blip r:embed="rId3"/>
+          <a:stretch>
+            <a:fillRect/>
+          </a:stretch>
+        </p:blipFill>
+        <p:spPr>
+          <a:xfrm>
+            <a:off x="4664365" y="474133"/>
+            <a:ext cx="2681400" cy="2717800"/>
+          </a:xfrm>
+          <a:prstGeom prst="rect">
+            <a:avLst/>
+          </a:prstGeom>
+        </p:spPr>
+      </p:pic>
+      <p:sp>
+        <p:nvSpPr>
+          <p:cNvPr id="17" name="Rectangle 16">
+            <a:extLst>
+              <a:ext uri="{FF2B5EF4-FFF2-40B4-BE49-F238E27FC236}">
+                <a16:creationId xmlns:a16="http://schemas.microsoft.com/office/drawing/2014/main" id="{6BDEE881-E8E3-4725-A31C-40F714E1FC3A}"/>
+              </a:ext>
+              <a:ext uri="{C183D7F6-B498-43B3-948B-1728B52AA6E4}">
+                <adec:decorative xmlns:adec="http://schemas.microsoft.com/office/drawing/2017/decorative" val="1"/>
+              </a:ext>
+            </a:extLst>
+          </p:cNvPr>
+          <p:cNvSpPr>
+            <a:spLocks noGrp="1" noRot="1" noChangeAspect="1" noMove="1" noResize="1" noEditPoints="1" noAdjustHandles="1" noChangeArrowheads="1" noChangeShapeType="1" noTextEdit="1"/>
+          </p:cNvSpPr>
+          <p:nvPr>
+            <p:extLst>
+              <p:ext uri="{386F3935-93C4-4BCD-93E2-E3B085C9AB24}">
+                <p16:designElem xmlns:p16="http://schemas.microsoft.com/office/powerpoint/2015/main" val="1"/>
+              </p:ext>
+            </p:extLst>
+          </p:nvPr>
+        </p:nvSpPr>
+        <p:spPr>
+          <a:xfrm>
+            <a:off x="321732" y="4155753"/>
+            <a:ext cx="4111054" cy="2380509"/>
+          </a:xfrm>
+          <a:prstGeom prst="rect">
+            <a:avLst/>
+          </a:prstGeom>
+          <a:solidFill>
+            <a:srgbClr val="FFFFFF"/>
+          </a:solidFill>
+          <a:ln w="15875" cap="sq">
+            <a:noFill/>
+            <a:miter lim="800000"/>
+          </a:ln>
+        </p:spPr>
+        <p:style>
+          <a:lnRef idx="2">
+            <a:schemeClr val="accent1">
+              <a:shade val="50000"/>
+            </a:schemeClr>
+          </a:lnRef>
+          <a:fillRef idx="1">
+            <a:schemeClr val="accent1"/>
+          </a:fillRef>
+          <a:effectRef idx="0">
+            <a:schemeClr val="accent1"/>
+          </a:effectRef>
+          <a:fontRef idx="minor">
+            <a:schemeClr val="lt1"/>
+          </a:fontRef>
+        </p:style>
+        <p:txBody>
+          <a:bodyPr rtlCol="0" anchor="ctr"/>
+          <a:lstStyle/>
+          <a:p>
+            <a:pPr algn="ctr"/>
+            <a:endParaRPr lang="en-US">
+              <a:solidFill>
+                <a:prstClr val="white"/>
+              </a:solidFill>
+              <a:latin typeface="Calibri" panose="020F0502020204030204"/>
+            </a:endParaRPr>
+          </a:p>
+        </p:txBody>
+      </p:sp>
+      <p:pic>
+        <p:nvPicPr>
+          <p:cNvPr id="6" name="Billede 5">
+            <a:extLst>
+              <a:ext uri="{FF2B5EF4-FFF2-40B4-BE49-F238E27FC236}">
+                <a16:creationId xmlns:a16="http://schemas.microsoft.com/office/drawing/2014/main" id="{4BDF22D2-CCF1-4E43-BE33-CF150875EC9D}"/>
+              </a:ext>
+            </a:extLst>
+          </p:cNvPr>
+          <p:cNvPicPr>
+            <a:picLocks noChangeAspect="1"/>
+          </p:cNvPicPr>
+          <p:nvPr/>
+        </p:nvPicPr>
+        <p:blipFill>
+          <a:blip r:embed="rId4"/>
+          <a:stretch>
+            <a:fillRect/>
+          </a:stretch>
+        </p:blipFill>
+        <p:spPr>
+          <a:xfrm>
+            <a:off x="655781" y="4557864"/>
+            <a:ext cx="3417455" cy="1469288"/>
+          </a:xfrm>
+          <a:prstGeom prst="rect">
+            <a:avLst/>
+          </a:prstGeom>
+        </p:spPr>
+      </p:pic>
+      <p:sp>
+        <p:nvSpPr>
+          <p:cNvPr id="19" name="Rectangle 18">
+            <a:extLst>
+              <a:ext uri="{FF2B5EF4-FFF2-40B4-BE49-F238E27FC236}">
+                <a16:creationId xmlns:a16="http://schemas.microsoft.com/office/drawing/2014/main" id="{FB202DE7-B82B-4D71-88F3-4363532A4BC9}"/>
+              </a:ext>
+              <a:ext uri="{C183D7F6-B498-43B3-948B-1728B52AA6E4}">
+                <adec:decorative xmlns:adec="http://schemas.microsoft.com/office/drawing/2017/decorative" val="1"/>
+              </a:ext>
+            </a:extLst>
+          </p:cNvPr>
+          <p:cNvSpPr>
+            <a:spLocks noGrp="1" noRot="1" noChangeAspect="1" noMove="1" noResize="1" noEditPoints="1" noAdjustHandles="1" noChangeArrowheads="1" noChangeShapeType="1" noTextEdit="1"/>
+          </p:cNvSpPr>
+          <p:nvPr>
+            <p:extLst>
+              <p:ext uri="{386F3935-93C4-4BCD-93E2-E3B085C9AB24}">
+                <p16:designElem xmlns:p16="http://schemas.microsoft.com/office/powerpoint/2015/main" val="1"/>
+              </p:ext>
+            </p:extLst>
+          </p:nvPr>
+        </p:nvSpPr>
+        <p:spPr>
+          <a:xfrm>
+            <a:off x="4579747" y="3509431"/>
+            <a:ext cx="2766017" cy="3026832"/>
+          </a:xfrm>
+          <a:prstGeom prst="rect">
+            <a:avLst/>
+          </a:prstGeom>
+          <a:solidFill>
+            <a:srgbClr val="FFFFFF"/>
+          </a:solidFill>
+          <a:ln w="15875" cap="sq">
+            <a:noFill/>
+            <a:miter lim="800000"/>
+          </a:ln>
+        </p:spPr>
+        <p:style>
+          <a:lnRef idx="2">
+            <a:schemeClr val="accent1">
+              <a:shade val="50000"/>
+            </a:schemeClr>
+          </a:lnRef>
+          <a:fillRef idx="1">
+            <a:schemeClr val="accent1"/>
+          </a:fillRef>
+          <a:effectRef idx="0">
+            <a:schemeClr val="accent1"/>
+          </a:effectRef>
+          <a:fontRef idx="minor">
+            <a:schemeClr val="lt1"/>
+          </a:fontRef>
+        </p:style>
+        <p:txBody>
+          <a:bodyPr rtlCol="0" anchor="ctr"/>
+          <a:lstStyle/>
+          <a:p>
+            <a:pPr algn="ctr"/>
+            <a:endParaRPr lang="en-US">
+              <a:solidFill>
+                <a:prstClr val="white"/>
+              </a:solidFill>
+              <a:latin typeface="Calibri" panose="020F0502020204030204"/>
+            </a:endParaRPr>
+          </a:p>
+        </p:txBody>
+      </p:sp>
+      <p:pic>
+        <p:nvPicPr>
+          <p:cNvPr id="4" name="Billede 3">
+            <a:extLst>
+              <a:ext uri="{FF2B5EF4-FFF2-40B4-BE49-F238E27FC236}">
+                <a16:creationId xmlns:a16="http://schemas.microsoft.com/office/drawing/2014/main" id="{B4B3CD45-1A08-4CAC-8669-C26F6F72FEC7}"/>
+              </a:ext>
+            </a:extLst>
+          </p:cNvPr>
+          <p:cNvPicPr>
+            <a:picLocks noChangeAspect="1"/>
+          </p:cNvPicPr>
+          <p:nvPr/>
+        </p:nvPicPr>
+        <p:blipFill>
+          <a:blip r:embed="rId5"/>
+          <a:stretch>
+            <a:fillRect/>
+          </a:stretch>
+        </p:blipFill>
+        <p:spPr>
+          <a:xfrm>
+            <a:off x="4741230" y="4332637"/>
+            <a:ext cx="2528403" cy="1440090"/>
+          </a:xfrm>
+          <a:prstGeom prst="rect">
+            <a:avLst/>
+          </a:prstGeom>
+        </p:spPr>
+      </p:pic>
+    </p:spTree>
+    <p:extLst>
+      <p:ext uri="{BB962C8B-B14F-4D97-AF65-F5344CB8AC3E}">
+        <p14:creationId xmlns:p14="http://schemas.microsoft.com/office/powerpoint/2010/main" val="641757707"/>
+      </p:ext>
+    </p:extLst>
+  </p:cSld>
+  <p:clrMapOvr>
+    <a:overrideClrMapping bg1="dk1" tx1="lt1" bg2="dk2" tx2="lt2" accent1="accent1" accent2="accent2" accent3="accent3" accent4="accent4" accent5="accent5" accent6="accent6" hlink="hlink" folHlink="folHlink"/>
   </p:clrMapOvr>
 </p:sld>
 </file>

</xml_diff>

<commit_message>
Updated presentation with new class diagram
</commit_message>
<xml_diff>
--- a/Præsentation.pptx
+++ b/Præsentation.pptx
@@ -125,8 +125,7 @@
 <file path=ppt/revisionInfo.xml><?xml version="1.0" encoding="utf-8"?>
 <p1510:revInfo xmlns:a="http://schemas.openxmlformats.org/drawingml/2006/main" xmlns:r="http://schemas.openxmlformats.org/officeDocument/2006/relationships" xmlns:p1510="http://schemas.microsoft.com/office/powerpoint/2015/10/main">
   <p1510:revLst>
-    <p1510:client id="{8116BDB2-3580-4DD9-9925-6D775CA2397B}" v="137" dt="2019-03-15T12:14:02.462"/>
-    <p1510:client id="{8408A93F-7755-464E-AD80-F58061F8CE1F}" v="103" dt="2019-03-15T12:17:45.951"/>
+    <p1510:client id="{8408A93F-7755-464E-AD80-F58061F8CE1F}" v="104" dt="2019-03-18T10:01:24.972"/>
   </p1510:revLst>
 </p1510:revInfo>
 </file>
@@ -134,9 +133,113 @@
 <file path=ppt/changesInfos/changesInfo1.xml><?xml version="1.0" encoding="utf-8"?>
 <pc:chgInfo xmlns:a="http://schemas.openxmlformats.org/drawingml/2006/main" xmlns:r="http://schemas.openxmlformats.org/officeDocument/2006/relationships" xmlns:ac="http://schemas.microsoft.com/office/drawing/2013/main/command" xmlns:pc="http://schemas.microsoft.com/office/powerpoint/2013/main/command">
   <pc:docChgLst>
+    <pc:chgData name="Mathias Thomassen" userId="816551f4347a7810" providerId="LiveId" clId="{8116BDB2-3580-4DD9-9925-6D775CA2397B}"/>
+    <pc:docChg chg="undo custSel mod modSld">
+      <pc:chgData name="Mathias Thomassen" userId="816551f4347a7810" providerId="LiveId" clId="{8116BDB2-3580-4DD9-9925-6D775CA2397B}" dt="2019-03-15T12:14:02.462" v="136" actId="14100"/>
+      <pc:docMkLst>
+        <pc:docMk/>
+      </pc:docMkLst>
+      <pc:sldChg chg="addSp delSp modSp delDesignElem">
+        <pc:chgData name="Mathias Thomassen" userId="816551f4347a7810" providerId="LiveId" clId="{8116BDB2-3580-4DD9-9925-6D775CA2397B}" dt="2019-03-15T12:14:02.462" v="136" actId="14100"/>
+        <pc:sldMkLst>
+          <pc:docMk/>
+          <pc:sldMk cId="1499206831" sldId="257"/>
+        </pc:sldMkLst>
+        <pc:spChg chg="add mod">
+          <ac:chgData name="Mathias Thomassen" userId="816551f4347a7810" providerId="LiveId" clId="{8116BDB2-3580-4DD9-9925-6D775CA2397B}" dt="2019-03-15T12:11:15.754" v="11"/>
+          <ac:spMkLst>
+            <pc:docMk/>
+            <pc:sldMk cId="1499206831" sldId="257"/>
+            <ac:spMk id="2" creationId="{47AAE8B5-D27C-44B8-BD49-C9013715E6FF}"/>
+          </ac:spMkLst>
+        </pc:spChg>
+        <pc:spChg chg="del">
+          <ac:chgData name="Mathias Thomassen" userId="816551f4347a7810" providerId="LiveId" clId="{8116BDB2-3580-4DD9-9925-6D775CA2397B}" dt="2019-03-15T12:10:19.578" v="5" actId="478"/>
+          <ac:spMkLst>
+            <pc:docMk/>
+            <pc:sldMk cId="1499206831" sldId="257"/>
+            <ac:spMk id="3" creationId="{70B1838F-B8F4-4254-B75B-C769531CE4F4}"/>
+          </ac:spMkLst>
+        </pc:spChg>
+        <pc:spChg chg="del">
+          <ac:chgData name="Mathias Thomassen" userId="816551f4347a7810" providerId="LiveId" clId="{8116BDB2-3580-4DD9-9925-6D775CA2397B}" dt="2019-03-15T12:09:41.886" v="0"/>
+          <ac:spMkLst>
+            <pc:docMk/>
+            <pc:sldMk cId="1499206831" sldId="257"/>
+            <ac:spMk id="4" creationId="{156718BD-D217-4A13-B0FF-20FCBA09615D}"/>
+          </ac:spMkLst>
+        </pc:spChg>
+        <pc:spChg chg="add mod">
+          <ac:chgData name="Mathias Thomassen" userId="816551f4347a7810" providerId="LiveId" clId="{8116BDB2-3580-4DD9-9925-6D775CA2397B}" dt="2019-03-15T12:11:15.754" v="11"/>
+          <ac:spMkLst>
+            <pc:docMk/>
+            <pc:sldMk cId="1499206831" sldId="257"/>
+            <ac:spMk id="5" creationId="{14F6ACB7-ED3C-415C-9453-255734A04A20}"/>
+          </ac:spMkLst>
+        </pc:spChg>
+        <pc:spChg chg="add mod">
+          <ac:chgData name="Mathias Thomassen" userId="816551f4347a7810" providerId="LiveId" clId="{8116BDB2-3580-4DD9-9925-6D775CA2397B}" dt="2019-03-15T12:11:43.196" v="24" actId="20577"/>
+          <ac:spMkLst>
+            <pc:docMk/>
+            <pc:sldMk cId="1499206831" sldId="257"/>
+            <ac:spMk id="6" creationId="{72B4C361-1205-4DFC-9BC0-ACE4E6F65FEC}"/>
+          </ac:spMkLst>
+        </pc:spChg>
+        <pc:spChg chg="add mod">
+          <ac:chgData name="Mathias Thomassen" userId="816551f4347a7810" providerId="LiveId" clId="{8116BDB2-3580-4DD9-9925-6D775CA2397B}" dt="2019-03-15T12:13:08.019" v="132" actId="2710"/>
+          <ac:spMkLst>
+            <pc:docMk/>
+            <pc:sldMk cId="1499206831" sldId="257"/>
+            <ac:spMk id="7" creationId="{03C4507C-6D0F-4EE4-99AD-6CE4213206BE}"/>
+          </ac:spMkLst>
+        </pc:spChg>
+        <pc:spChg chg="add del">
+          <ac:chgData name="Mathias Thomassen" userId="816551f4347a7810" providerId="LiveId" clId="{8116BDB2-3580-4DD9-9925-6D775CA2397B}" dt="2019-03-15T12:11:15.754" v="11"/>
+          <ac:spMkLst>
+            <pc:docMk/>
+            <pc:sldMk cId="1499206831" sldId="257"/>
+            <ac:spMk id="19" creationId="{D4C3103B-AE2E-41DA-8805-65F1A948FD5A}"/>
+          </ac:spMkLst>
+        </pc:spChg>
+        <pc:spChg chg="add del">
+          <ac:chgData name="Mathias Thomassen" userId="816551f4347a7810" providerId="LiveId" clId="{8116BDB2-3580-4DD9-9925-6D775CA2397B}" dt="2019-03-15T12:11:15.754" v="11"/>
+          <ac:spMkLst>
+            <pc:docMk/>
+            <pc:sldMk cId="1499206831" sldId="257"/>
+            <ac:spMk id="20" creationId="{E3BC0C31-69A7-4200-9AFE-927230E1E04C}"/>
+          </ac:spMkLst>
+        </pc:spChg>
+        <pc:spChg chg="add del">
+          <ac:chgData name="Mathias Thomassen" userId="816551f4347a7810" providerId="LiveId" clId="{8116BDB2-3580-4DD9-9925-6D775CA2397B}" dt="2019-03-15T12:11:15.754" v="11"/>
+          <ac:spMkLst>
+            <pc:docMk/>
+            <pc:sldMk cId="1499206831" sldId="257"/>
+            <ac:spMk id="22" creationId="{CB1340FC-C4E2-4CD5-9BCA-7A022E8B4989}"/>
+          </ac:spMkLst>
+        </pc:spChg>
+        <pc:picChg chg="add mod">
+          <ac:chgData name="Mathias Thomassen" userId="816551f4347a7810" providerId="LiveId" clId="{8116BDB2-3580-4DD9-9925-6D775CA2397B}" dt="2019-03-15T12:14:02.462" v="136" actId="14100"/>
+          <ac:picMkLst>
+            <pc:docMk/>
+            <pc:sldMk cId="1499206831" sldId="257"/>
+            <ac:picMk id="1026" creationId="{4F13FAD0-4FE5-484B-88BB-F4E987C128F5}"/>
+          </ac:picMkLst>
+        </pc:picChg>
+        <pc:cxnChg chg="add del">
+          <ac:chgData name="Mathias Thomassen" userId="816551f4347a7810" providerId="LiveId" clId="{8116BDB2-3580-4DD9-9925-6D775CA2397B}" dt="2019-03-15T12:11:15.754" v="11"/>
+          <ac:cxnSpMkLst>
+            <pc:docMk/>
+            <pc:sldMk cId="1499206831" sldId="257"/>
+            <ac:cxnSpMk id="21" creationId="{45B5AFC7-2F07-4F7B-9151-E45D7548D8F3}"/>
+          </ac:cxnSpMkLst>
+        </pc:cxnChg>
+      </pc:sldChg>
+    </pc:docChg>
+  </pc:docChgLst>
+  <pc:docChgLst>
     <pc:chgData name="Thomas Møller" userId="ead78d0927e6b416" providerId="LiveId" clId="{8408A93F-7755-464E-AD80-F58061F8CE1F}"/>
     <pc:docChg chg="undo custSel mod addSld modSld">
-      <pc:chgData name="Thomas Møller" userId="ead78d0927e6b416" providerId="LiveId" clId="{8408A93F-7755-464E-AD80-F58061F8CE1F}" dt="2019-03-15T12:17:45.952" v="138" actId="1038"/>
+      <pc:chgData name="Thomas Møller" userId="ead78d0927e6b416" providerId="LiveId" clId="{8408A93F-7755-464E-AD80-F58061F8CE1F}" dt="2019-03-18T10:01:51.593" v="171" actId="1038"/>
       <pc:docMkLst>
         <pc:docMk/>
       </pc:docMkLst>
@@ -315,7 +418,7 @@
         </pc:cxnChg>
       </pc:sldChg>
       <pc:sldChg chg="addSp delSp modSp add">
-        <pc:chgData name="Thomas Møller" userId="ead78d0927e6b416" providerId="LiveId" clId="{8408A93F-7755-464E-AD80-F58061F8CE1F}" dt="2019-03-15T12:12:53.861" v="64" actId="1076"/>
+        <pc:chgData name="Thomas Møller" userId="ead78d0927e6b416" providerId="LiveId" clId="{8408A93F-7755-464E-AD80-F58061F8CE1F}" dt="2019-03-18T10:01:51.593" v="171" actId="1038"/>
         <pc:sldMkLst>
           <pc:docMk/>
           <pc:sldMk cId="411581429" sldId="258"/>
@@ -368,6 +471,22 @@
             <ac:spMk id="8" creationId="{2613B146-AC2B-4DD4-99D6-288CAA25073D}"/>
           </ac:spMkLst>
         </pc:spChg>
+        <pc:picChg chg="del">
+          <ac:chgData name="Thomas Møller" userId="ead78d0927e6b416" providerId="LiveId" clId="{8408A93F-7755-464E-AD80-F58061F8CE1F}" dt="2019-03-18T10:01:23.807" v="139" actId="478"/>
+          <ac:picMkLst>
+            <pc:docMk/>
+            <pc:sldMk cId="411581429" sldId="258"/>
+            <ac:picMk id="2" creationId="{A34B52E5-913A-4AE4-8906-ACB2BCE37D6F}"/>
+          </ac:picMkLst>
+        </pc:picChg>
+        <pc:picChg chg="add mod">
+          <ac:chgData name="Thomas Møller" userId="ead78d0927e6b416" providerId="LiveId" clId="{8408A93F-7755-464E-AD80-F58061F8CE1F}" dt="2019-03-18T10:01:51.593" v="171" actId="1038"/>
+          <ac:picMkLst>
+            <pc:docMk/>
+            <pc:sldMk cId="411581429" sldId="258"/>
+            <ac:picMk id="4" creationId="{484C22A2-5727-407D-A68E-0B842A0D009E}"/>
+          </ac:picMkLst>
+        </pc:picChg>
         <pc:picChg chg="add mod">
           <ac:chgData name="Thomas Møller" userId="ead78d0927e6b416" providerId="LiveId" clId="{8408A93F-7755-464E-AD80-F58061F8CE1F}" dt="2019-03-15T12:12:53.861" v="64" actId="1076"/>
           <ac:picMkLst>
@@ -399,110 +518,6 @@
             <ac:picMk id="3" creationId="{1B18D097-DC76-4F49-9EC7-9C0EE8B0F182}"/>
           </ac:picMkLst>
         </pc:picChg>
-      </pc:sldChg>
-    </pc:docChg>
-  </pc:docChgLst>
-  <pc:docChgLst>
-    <pc:chgData name="Mathias Thomassen" userId="816551f4347a7810" providerId="LiveId" clId="{8116BDB2-3580-4DD9-9925-6D775CA2397B}"/>
-    <pc:docChg chg="undo custSel mod modSld">
-      <pc:chgData name="Mathias Thomassen" userId="816551f4347a7810" providerId="LiveId" clId="{8116BDB2-3580-4DD9-9925-6D775CA2397B}" dt="2019-03-15T12:14:02.462" v="136" actId="14100"/>
-      <pc:docMkLst>
-        <pc:docMk/>
-      </pc:docMkLst>
-      <pc:sldChg chg="addSp delSp modSp delDesignElem">
-        <pc:chgData name="Mathias Thomassen" userId="816551f4347a7810" providerId="LiveId" clId="{8116BDB2-3580-4DD9-9925-6D775CA2397B}" dt="2019-03-15T12:14:02.462" v="136" actId="14100"/>
-        <pc:sldMkLst>
-          <pc:docMk/>
-          <pc:sldMk cId="1499206831" sldId="257"/>
-        </pc:sldMkLst>
-        <pc:spChg chg="add mod">
-          <ac:chgData name="Mathias Thomassen" userId="816551f4347a7810" providerId="LiveId" clId="{8116BDB2-3580-4DD9-9925-6D775CA2397B}" dt="2019-03-15T12:11:15.754" v="11"/>
-          <ac:spMkLst>
-            <pc:docMk/>
-            <pc:sldMk cId="1499206831" sldId="257"/>
-            <ac:spMk id="2" creationId="{47AAE8B5-D27C-44B8-BD49-C9013715E6FF}"/>
-          </ac:spMkLst>
-        </pc:spChg>
-        <pc:spChg chg="del">
-          <ac:chgData name="Mathias Thomassen" userId="816551f4347a7810" providerId="LiveId" clId="{8116BDB2-3580-4DD9-9925-6D775CA2397B}" dt="2019-03-15T12:10:19.578" v="5" actId="478"/>
-          <ac:spMkLst>
-            <pc:docMk/>
-            <pc:sldMk cId="1499206831" sldId="257"/>
-            <ac:spMk id="3" creationId="{70B1838F-B8F4-4254-B75B-C769531CE4F4}"/>
-          </ac:spMkLst>
-        </pc:spChg>
-        <pc:spChg chg="del">
-          <ac:chgData name="Mathias Thomassen" userId="816551f4347a7810" providerId="LiveId" clId="{8116BDB2-3580-4DD9-9925-6D775CA2397B}" dt="2019-03-15T12:09:41.886" v="0"/>
-          <ac:spMkLst>
-            <pc:docMk/>
-            <pc:sldMk cId="1499206831" sldId="257"/>
-            <ac:spMk id="4" creationId="{156718BD-D217-4A13-B0FF-20FCBA09615D}"/>
-          </ac:spMkLst>
-        </pc:spChg>
-        <pc:spChg chg="add mod">
-          <ac:chgData name="Mathias Thomassen" userId="816551f4347a7810" providerId="LiveId" clId="{8116BDB2-3580-4DD9-9925-6D775CA2397B}" dt="2019-03-15T12:11:15.754" v="11"/>
-          <ac:spMkLst>
-            <pc:docMk/>
-            <pc:sldMk cId="1499206831" sldId="257"/>
-            <ac:spMk id="5" creationId="{14F6ACB7-ED3C-415C-9453-255734A04A20}"/>
-          </ac:spMkLst>
-        </pc:spChg>
-        <pc:spChg chg="add mod">
-          <ac:chgData name="Mathias Thomassen" userId="816551f4347a7810" providerId="LiveId" clId="{8116BDB2-3580-4DD9-9925-6D775CA2397B}" dt="2019-03-15T12:11:43.196" v="24" actId="20577"/>
-          <ac:spMkLst>
-            <pc:docMk/>
-            <pc:sldMk cId="1499206831" sldId="257"/>
-            <ac:spMk id="6" creationId="{72B4C361-1205-4DFC-9BC0-ACE4E6F65FEC}"/>
-          </ac:spMkLst>
-        </pc:spChg>
-        <pc:spChg chg="add mod">
-          <ac:chgData name="Mathias Thomassen" userId="816551f4347a7810" providerId="LiveId" clId="{8116BDB2-3580-4DD9-9925-6D775CA2397B}" dt="2019-03-15T12:13:08.019" v="132" actId="2710"/>
-          <ac:spMkLst>
-            <pc:docMk/>
-            <pc:sldMk cId="1499206831" sldId="257"/>
-            <ac:spMk id="7" creationId="{03C4507C-6D0F-4EE4-99AD-6CE4213206BE}"/>
-          </ac:spMkLst>
-        </pc:spChg>
-        <pc:spChg chg="add del">
-          <ac:chgData name="Mathias Thomassen" userId="816551f4347a7810" providerId="LiveId" clId="{8116BDB2-3580-4DD9-9925-6D775CA2397B}" dt="2019-03-15T12:11:15.754" v="11"/>
-          <ac:spMkLst>
-            <pc:docMk/>
-            <pc:sldMk cId="1499206831" sldId="257"/>
-            <ac:spMk id="19" creationId="{D4C3103B-AE2E-41DA-8805-65F1A948FD5A}"/>
-          </ac:spMkLst>
-        </pc:spChg>
-        <pc:spChg chg="add del">
-          <ac:chgData name="Mathias Thomassen" userId="816551f4347a7810" providerId="LiveId" clId="{8116BDB2-3580-4DD9-9925-6D775CA2397B}" dt="2019-03-15T12:11:15.754" v="11"/>
-          <ac:spMkLst>
-            <pc:docMk/>
-            <pc:sldMk cId="1499206831" sldId="257"/>
-            <ac:spMk id="20" creationId="{E3BC0C31-69A7-4200-9AFE-927230E1E04C}"/>
-          </ac:spMkLst>
-        </pc:spChg>
-        <pc:spChg chg="add del">
-          <ac:chgData name="Mathias Thomassen" userId="816551f4347a7810" providerId="LiveId" clId="{8116BDB2-3580-4DD9-9925-6D775CA2397B}" dt="2019-03-15T12:11:15.754" v="11"/>
-          <ac:spMkLst>
-            <pc:docMk/>
-            <pc:sldMk cId="1499206831" sldId="257"/>
-            <ac:spMk id="22" creationId="{CB1340FC-C4E2-4CD5-9BCA-7A022E8B4989}"/>
-          </ac:spMkLst>
-        </pc:spChg>
-        <pc:picChg chg="add mod">
-          <ac:chgData name="Mathias Thomassen" userId="816551f4347a7810" providerId="LiveId" clId="{8116BDB2-3580-4DD9-9925-6D775CA2397B}" dt="2019-03-15T12:14:02.462" v="136" actId="14100"/>
-          <ac:picMkLst>
-            <pc:docMk/>
-            <pc:sldMk cId="1499206831" sldId="257"/>
-            <ac:picMk id="1026" creationId="{4F13FAD0-4FE5-484B-88BB-F4E987C128F5}"/>
-          </ac:picMkLst>
-        </pc:picChg>
-        <pc:cxnChg chg="add del">
-          <ac:chgData name="Mathias Thomassen" userId="816551f4347a7810" providerId="LiveId" clId="{8116BDB2-3580-4DD9-9925-6D775CA2397B}" dt="2019-03-15T12:11:15.754" v="11"/>
-          <ac:cxnSpMkLst>
-            <pc:docMk/>
-            <pc:sldMk cId="1499206831" sldId="257"/>
-            <ac:cxnSpMk id="21" creationId="{45B5AFC7-2F07-4F7B-9151-E45D7548D8F3}"/>
-          </ac:cxnSpMkLst>
-        </pc:cxnChg>
       </pc:sldChg>
     </pc:docChg>
   </pc:docChgLst>
@@ -4529,12 +4544,40 @@
           <a:chExt cx="0" cy="0"/>
         </a:xfrm>
       </p:grpSpPr>
+      <p:sp>
+        <p:nvSpPr>
+          <p:cNvPr id="8" name="Titel 7">
+            <a:extLst>
+              <a:ext uri="{FF2B5EF4-FFF2-40B4-BE49-F238E27FC236}">
+                <a16:creationId xmlns:a16="http://schemas.microsoft.com/office/drawing/2014/main" id="{2613B146-AC2B-4DD4-99D6-288CAA25073D}"/>
+              </a:ext>
+            </a:extLst>
+          </p:cNvPr>
+          <p:cNvSpPr>
+            <a:spLocks noGrp="1"/>
+          </p:cNvSpPr>
+          <p:nvPr>
+            <p:ph type="title"/>
+          </p:nvPr>
+        </p:nvSpPr>
+        <p:spPr/>
+        <p:txBody>
+          <a:bodyPr/>
+          <a:lstStyle/>
+          <a:p>
+            <a:r>
+              <a:rPr lang="da-DK" dirty="0"/>
+              <a:t>Klassediagram</a:t>
+            </a:r>
+          </a:p>
+        </p:txBody>
+      </p:sp>
       <p:pic>
         <p:nvPicPr>
-          <p:cNvPr id="2" name="Billede 1">
-            <a:extLst>
-              <a:ext uri="{FF2B5EF4-FFF2-40B4-BE49-F238E27FC236}">
-                <a16:creationId xmlns:a16="http://schemas.microsoft.com/office/drawing/2014/main" id="{A34B52E5-913A-4AE4-8906-ACB2BCE37D6F}"/>
+          <p:cNvPr id="3" name="Billede 2">
+            <a:extLst>
+              <a:ext uri="{FF2B5EF4-FFF2-40B4-BE49-F238E27FC236}">
+                <a16:creationId xmlns:a16="http://schemas.microsoft.com/office/drawing/2014/main" id="{FED43B8A-C61C-4656-8000-4CB331AD1A3E}"/>
               </a:ext>
             </a:extLst>
           </p:cNvPr>
@@ -4551,48 +4594,20 @@
         </p:blipFill>
         <p:spPr>
           <a:xfrm>
-            <a:off x="2990400" y="549606"/>
-            <a:ext cx="8424754" cy="5758788"/>
+            <a:off x="1145921" y="1611064"/>
+            <a:ext cx="1771650" cy="4667250"/>
           </a:xfrm>
           <a:prstGeom prst="rect">
             <a:avLst/>
           </a:prstGeom>
         </p:spPr>
       </p:pic>
-      <p:sp>
-        <p:nvSpPr>
-          <p:cNvPr id="8" name="Titel 7">
-            <a:extLst>
-              <a:ext uri="{FF2B5EF4-FFF2-40B4-BE49-F238E27FC236}">
-                <a16:creationId xmlns:a16="http://schemas.microsoft.com/office/drawing/2014/main" id="{2613B146-AC2B-4DD4-99D6-288CAA25073D}"/>
-              </a:ext>
-            </a:extLst>
-          </p:cNvPr>
-          <p:cNvSpPr>
-            <a:spLocks noGrp="1"/>
-          </p:cNvSpPr>
-          <p:nvPr>
-            <p:ph type="title"/>
-          </p:nvPr>
-        </p:nvSpPr>
-        <p:spPr/>
-        <p:txBody>
-          <a:bodyPr/>
-          <a:lstStyle/>
-          <a:p>
-            <a:r>
-              <a:rPr lang="da-DK" dirty="0"/>
-              <a:t>Klassediagram</a:t>
-            </a:r>
-          </a:p>
-        </p:txBody>
-      </p:sp>
       <p:pic>
         <p:nvPicPr>
-          <p:cNvPr id="3" name="Billede 2">
-            <a:extLst>
-              <a:ext uri="{FF2B5EF4-FFF2-40B4-BE49-F238E27FC236}">
-                <a16:creationId xmlns:a16="http://schemas.microsoft.com/office/drawing/2014/main" id="{FED43B8A-C61C-4656-8000-4CB331AD1A3E}"/>
+          <p:cNvPr id="4" name="Billede 3">
+            <a:extLst>
+              <a:ext uri="{FF2B5EF4-FFF2-40B4-BE49-F238E27FC236}">
+                <a16:creationId xmlns:a16="http://schemas.microsoft.com/office/drawing/2014/main" id="{484C22A2-5727-407D-A68E-0B842A0D009E}"/>
               </a:ext>
             </a:extLst>
           </p:cNvPr>
@@ -4609,8 +4624,8 @@
         </p:blipFill>
         <p:spPr>
           <a:xfrm>
-            <a:off x="1145921" y="1611064"/>
-            <a:ext cx="1771650" cy="4667250"/>
+            <a:off x="3327945" y="304798"/>
+            <a:ext cx="8419302" cy="6144966"/>
           </a:xfrm>
           <a:prstGeom prst="rect">
             <a:avLst/>

</xml_diff>

<commit_message>
Made changes to pp
</commit_message>
<xml_diff>
--- a/Præsentation.pptx
+++ b/Præsentation.pptx
@@ -5,16 +5,17 @@
     <p:sldMasterId id="2147483648" r:id="rId1"/>
   </p:sldMasterIdLst>
   <p:notesMasterIdLst>
-    <p:notesMasterId r:id="rId9"/>
+    <p:notesMasterId r:id="rId10"/>
   </p:notesMasterIdLst>
   <p:sldIdLst>
     <p:sldId id="256" r:id="rId2"/>
-    <p:sldId id="257" r:id="rId3"/>
-    <p:sldId id="262" r:id="rId4"/>
+    <p:sldId id="262" r:id="rId3"/>
+    <p:sldId id="257" r:id="rId4"/>
     <p:sldId id="258" r:id="rId5"/>
     <p:sldId id="260" r:id="rId6"/>
     <p:sldId id="259" r:id="rId7"/>
     <p:sldId id="261" r:id="rId8"/>
+    <p:sldId id="263" r:id="rId9"/>
   </p:sldIdLst>
   <p:sldSz cx="12192000" cy="6858000"/>
   <p:notesSz cx="6858000" cy="9144000"/>
@@ -131,110 +132,6 @@
 
 <file path=ppt/changesInfos/changesInfo1.xml><?xml version="1.0" encoding="utf-8"?>
 <pc:chgInfo xmlns:a="http://schemas.openxmlformats.org/drawingml/2006/main" xmlns:r="http://schemas.openxmlformats.org/officeDocument/2006/relationships" xmlns:ac="http://schemas.microsoft.com/office/drawing/2013/main/command" xmlns:pc="http://schemas.microsoft.com/office/powerpoint/2013/main/command">
-  <pc:docChgLst>
-    <pc:chgData name="Mathias Thomassen" userId="816551f4347a7810" providerId="LiveId" clId="{8116BDB2-3580-4DD9-9925-6D775CA2397B}"/>
-    <pc:docChg chg="undo custSel mod modSld">
-      <pc:chgData name="Mathias Thomassen" userId="816551f4347a7810" providerId="LiveId" clId="{8116BDB2-3580-4DD9-9925-6D775CA2397B}" dt="2019-03-15T12:14:02.462" v="136" actId="14100"/>
-      <pc:docMkLst>
-        <pc:docMk/>
-      </pc:docMkLst>
-      <pc:sldChg chg="addSp delSp modSp delDesignElem">
-        <pc:chgData name="Mathias Thomassen" userId="816551f4347a7810" providerId="LiveId" clId="{8116BDB2-3580-4DD9-9925-6D775CA2397B}" dt="2019-03-15T12:14:02.462" v="136" actId="14100"/>
-        <pc:sldMkLst>
-          <pc:docMk/>
-          <pc:sldMk cId="1499206831" sldId="257"/>
-        </pc:sldMkLst>
-        <pc:spChg chg="add mod">
-          <ac:chgData name="Mathias Thomassen" userId="816551f4347a7810" providerId="LiveId" clId="{8116BDB2-3580-4DD9-9925-6D775CA2397B}" dt="2019-03-15T12:11:15.754" v="11"/>
-          <ac:spMkLst>
-            <pc:docMk/>
-            <pc:sldMk cId="1499206831" sldId="257"/>
-            <ac:spMk id="2" creationId="{47AAE8B5-D27C-44B8-BD49-C9013715E6FF}"/>
-          </ac:spMkLst>
-        </pc:spChg>
-        <pc:spChg chg="del">
-          <ac:chgData name="Mathias Thomassen" userId="816551f4347a7810" providerId="LiveId" clId="{8116BDB2-3580-4DD9-9925-6D775CA2397B}" dt="2019-03-15T12:10:19.578" v="5" actId="478"/>
-          <ac:spMkLst>
-            <pc:docMk/>
-            <pc:sldMk cId="1499206831" sldId="257"/>
-            <ac:spMk id="3" creationId="{70B1838F-B8F4-4254-B75B-C769531CE4F4}"/>
-          </ac:spMkLst>
-        </pc:spChg>
-        <pc:spChg chg="del">
-          <ac:chgData name="Mathias Thomassen" userId="816551f4347a7810" providerId="LiveId" clId="{8116BDB2-3580-4DD9-9925-6D775CA2397B}" dt="2019-03-15T12:09:41.886" v="0"/>
-          <ac:spMkLst>
-            <pc:docMk/>
-            <pc:sldMk cId="1499206831" sldId="257"/>
-            <ac:spMk id="4" creationId="{156718BD-D217-4A13-B0FF-20FCBA09615D}"/>
-          </ac:spMkLst>
-        </pc:spChg>
-        <pc:spChg chg="add mod">
-          <ac:chgData name="Mathias Thomassen" userId="816551f4347a7810" providerId="LiveId" clId="{8116BDB2-3580-4DD9-9925-6D775CA2397B}" dt="2019-03-15T12:11:15.754" v="11"/>
-          <ac:spMkLst>
-            <pc:docMk/>
-            <pc:sldMk cId="1499206831" sldId="257"/>
-            <ac:spMk id="5" creationId="{14F6ACB7-ED3C-415C-9453-255734A04A20}"/>
-          </ac:spMkLst>
-        </pc:spChg>
-        <pc:spChg chg="add mod">
-          <ac:chgData name="Mathias Thomassen" userId="816551f4347a7810" providerId="LiveId" clId="{8116BDB2-3580-4DD9-9925-6D775CA2397B}" dt="2019-03-15T12:11:43.196" v="24" actId="20577"/>
-          <ac:spMkLst>
-            <pc:docMk/>
-            <pc:sldMk cId="1499206831" sldId="257"/>
-            <ac:spMk id="6" creationId="{72B4C361-1205-4DFC-9BC0-ACE4E6F65FEC}"/>
-          </ac:spMkLst>
-        </pc:spChg>
-        <pc:spChg chg="add mod">
-          <ac:chgData name="Mathias Thomassen" userId="816551f4347a7810" providerId="LiveId" clId="{8116BDB2-3580-4DD9-9925-6D775CA2397B}" dt="2019-03-15T12:13:08.019" v="132" actId="2710"/>
-          <ac:spMkLst>
-            <pc:docMk/>
-            <pc:sldMk cId="1499206831" sldId="257"/>
-            <ac:spMk id="7" creationId="{03C4507C-6D0F-4EE4-99AD-6CE4213206BE}"/>
-          </ac:spMkLst>
-        </pc:spChg>
-        <pc:spChg chg="add del">
-          <ac:chgData name="Mathias Thomassen" userId="816551f4347a7810" providerId="LiveId" clId="{8116BDB2-3580-4DD9-9925-6D775CA2397B}" dt="2019-03-15T12:11:15.754" v="11"/>
-          <ac:spMkLst>
-            <pc:docMk/>
-            <pc:sldMk cId="1499206831" sldId="257"/>
-            <ac:spMk id="19" creationId="{D4C3103B-AE2E-41DA-8805-65F1A948FD5A}"/>
-          </ac:spMkLst>
-        </pc:spChg>
-        <pc:spChg chg="add del">
-          <ac:chgData name="Mathias Thomassen" userId="816551f4347a7810" providerId="LiveId" clId="{8116BDB2-3580-4DD9-9925-6D775CA2397B}" dt="2019-03-15T12:11:15.754" v="11"/>
-          <ac:spMkLst>
-            <pc:docMk/>
-            <pc:sldMk cId="1499206831" sldId="257"/>
-            <ac:spMk id="20" creationId="{E3BC0C31-69A7-4200-9AFE-927230E1E04C}"/>
-          </ac:spMkLst>
-        </pc:spChg>
-        <pc:spChg chg="add del">
-          <ac:chgData name="Mathias Thomassen" userId="816551f4347a7810" providerId="LiveId" clId="{8116BDB2-3580-4DD9-9925-6D775CA2397B}" dt="2019-03-15T12:11:15.754" v="11"/>
-          <ac:spMkLst>
-            <pc:docMk/>
-            <pc:sldMk cId="1499206831" sldId="257"/>
-            <ac:spMk id="22" creationId="{CB1340FC-C4E2-4CD5-9BCA-7A022E8B4989}"/>
-          </ac:spMkLst>
-        </pc:spChg>
-        <pc:picChg chg="add mod">
-          <ac:chgData name="Mathias Thomassen" userId="816551f4347a7810" providerId="LiveId" clId="{8116BDB2-3580-4DD9-9925-6D775CA2397B}" dt="2019-03-15T12:14:02.462" v="136" actId="14100"/>
-          <ac:picMkLst>
-            <pc:docMk/>
-            <pc:sldMk cId="1499206831" sldId="257"/>
-            <ac:picMk id="1026" creationId="{4F13FAD0-4FE5-484B-88BB-F4E987C128F5}"/>
-          </ac:picMkLst>
-        </pc:picChg>
-        <pc:cxnChg chg="add del">
-          <ac:chgData name="Mathias Thomassen" userId="816551f4347a7810" providerId="LiveId" clId="{8116BDB2-3580-4DD9-9925-6D775CA2397B}" dt="2019-03-15T12:11:15.754" v="11"/>
-          <ac:cxnSpMkLst>
-            <pc:docMk/>
-            <pc:sldMk cId="1499206831" sldId="257"/>
-            <ac:cxnSpMk id="21" creationId="{45B5AFC7-2F07-4F7B-9151-E45D7548D8F3}"/>
-          </ac:cxnSpMkLst>
-        </pc:cxnChg>
-      </pc:sldChg>
-    </pc:docChg>
-  </pc:docChgLst>
   <pc:docChgLst>
     <pc:chgData name="Thomas Møller" userId="ead78d0927e6b416" providerId="LiveId" clId="{8408A93F-7755-464E-AD80-F58061F8CE1F}"/>
     <pc:docChg chg="undo custSel mod addSld delSld modSld">
@@ -524,6 +421,110 @@
           <pc:docMk/>
           <pc:sldMk cId="4098217802" sldId="263"/>
         </pc:sldMkLst>
+      </pc:sldChg>
+    </pc:docChg>
+  </pc:docChgLst>
+  <pc:docChgLst>
+    <pc:chgData name="Mathias Thomassen" userId="816551f4347a7810" providerId="LiveId" clId="{8116BDB2-3580-4DD9-9925-6D775CA2397B}"/>
+    <pc:docChg chg="undo custSel mod modSld">
+      <pc:chgData name="Mathias Thomassen" userId="816551f4347a7810" providerId="LiveId" clId="{8116BDB2-3580-4DD9-9925-6D775CA2397B}" dt="2019-03-15T12:14:02.462" v="136" actId="14100"/>
+      <pc:docMkLst>
+        <pc:docMk/>
+      </pc:docMkLst>
+      <pc:sldChg chg="addSp delSp modSp delDesignElem">
+        <pc:chgData name="Mathias Thomassen" userId="816551f4347a7810" providerId="LiveId" clId="{8116BDB2-3580-4DD9-9925-6D775CA2397B}" dt="2019-03-15T12:14:02.462" v="136" actId="14100"/>
+        <pc:sldMkLst>
+          <pc:docMk/>
+          <pc:sldMk cId="1499206831" sldId="257"/>
+        </pc:sldMkLst>
+        <pc:spChg chg="add mod">
+          <ac:chgData name="Mathias Thomassen" userId="816551f4347a7810" providerId="LiveId" clId="{8116BDB2-3580-4DD9-9925-6D775CA2397B}" dt="2019-03-15T12:11:15.754" v="11"/>
+          <ac:spMkLst>
+            <pc:docMk/>
+            <pc:sldMk cId="1499206831" sldId="257"/>
+            <ac:spMk id="2" creationId="{47AAE8B5-D27C-44B8-BD49-C9013715E6FF}"/>
+          </ac:spMkLst>
+        </pc:spChg>
+        <pc:spChg chg="del">
+          <ac:chgData name="Mathias Thomassen" userId="816551f4347a7810" providerId="LiveId" clId="{8116BDB2-3580-4DD9-9925-6D775CA2397B}" dt="2019-03-15T12:10:19.578" v="5" actId="478"/>
+          <ac:spMkLst>
+            <pc:docMk/>
+            <pc:sldMk cId="1499206831" sldId="257"/>
+            <ac:spMk id="3" creationId="{70B1838F-B8F4-4254-B75B-C769531CE4F4}"/>
+          </ac:spMkLst>
+        </pc:spChg>
+        <pc:spChg chg="del">
+          <ac:chgData name="Mathias Thomassen" userId="816551f4347a7810" providerId="LiveId" clId="{8116BDB2-3580-4DD9-9925-6D775CA2397B}" dt="2019-03-15T12:09:41.886" v="0"/>
+          <ac:spMkLst>
+            <pc:docMk/>
+            <pc:sldMk cId="1499206831" sldId="257"/>
+            <ac:spMk id="4" creationId="{156718BD-D217-4A13-B0FF-20FCBA09615D}"/>
+          </ac:spMkLst>
+        </pc:spChg>
+        <pc:spChg chg="add mod">
+          <ac:chgData name="Mathias Thomassen" userId="816551f4347a7810" providerId="LiveId" clId="{8116BDB2-3580-4DD9-9925-6D775CA2397B}" dt="2019-03-15T12:11:15.754" v="11"/>
+          <ac:spMkLst>
+            <pc:docMk/>
+            <pc:sldMk cId="1499206831" sldId="257"/>
+            <ac:spMk id="5" creationId="{14F6ACB7-ED3C-415C-9453-255734A04A20}"/>
+          </ac:spMkLst>
+        </pc:spChg>
+        <pc:spChg chg="add mod">
+          <ac:chgData name="Mathias Thomassen" userId="816551f4347a7810" providerId="LiveId" clId="{8116BDB2-3580-4DD9-9925-6D775CA2397B}" dt="2019-03-15T12:11:43.196" v="24" actId="20577"/>
+          <ac:spMkLst>
+            <pc:docMk/>
+            <pc:sldMk cId="1499206831" sldId="257"/>
+            <ac:spMk id="6" creationId="{72B4C361-1205-4DFC-9BC0-ACE4E6F65FEC}"/>
+          </ac:spMkLst>
+        </pc:spChg>
+        <pc:spChg chg="add mod">
+          <ac:chgData name="Mathias Thomassen" userId="816551f4347a7810" providerId="LiveId" clId="{8116BDB2-3580-4DD9-9925-6D775CA2397B}" dt="2019-03-15T12:13:08.019" v="132" actId="2710"/>
+          <ac:spMkLst>
+            <pc:docMk/>
+            <pc:sldMk cId="1499206831" sldId="257"/>
+            <ac:spMk id="7" creationId="{03C4507C-6D0F-4EE4-99AD-6CE4213206BE}"/>
+          </ac:spMkLst>
+        </pc:spChg>
+        <pc:spChg chg="add del">
+          <ac:chgData name="Mathias Thomassen" userId="816551f4347a7810" providerId="LiveId" clId="{8116BDB2-3580-4DD9-9925-6D775CA2397B}" dt="2019-03-15T12:11:15.754" v="11"/>
+          <ac:spMkLst>
+            <pc:docMk/>
+            <pc:sldMk cId="1499206831" sldId="257"/>
+            <ac:spMk id="19" creationId="{D4C3103B-AE2E-41DA-8805-65F1A948FD5A}"/>
+          </ac:spMkLst>
+        </pc:spChg>
+        <pc:spChg chg="add del">
+          <ac:chgData name="Mathias Thomassen" userId="816551f4347a7810" providerId="LiveId" clId="{8116BDB2-3580-4DD9-9925-6D775CA2397B}" dt="2019-03-15T12:11:15.754" v="11"/>
+          <ac:spMkLst>
+            <pc:docMk/>
+            <pc:sldMk cId="1499206831" sldId="257"/>
+            <ac:spMk id="20" creationId="{E3BC0C31-69A7-4200-9AFE-927230E1E04C}"/>
+          </ac:spMkLst>
+        </pc:spChg>
+        <pc:spChg chg="add del">
+          <ac:chgData name="Mathias Thomassen" userId="816551f4347a7810" providerId="LiveId" clId="{8116BDB2-3580-4DD9-9925-6D775CA2397B}" dt="2019-03-15T12:11:15.754" v="11"/>
+          <ac:spMkLst>
+            <pc:docMk/>
+            <pc:sldMk cId="1499206831" sldId="257"/>
+            <ac:spMk id="22" creationId="{CB1340FC-C4E2-4CD5-9BCA-7A022E8B4989}"/>
+          </ac:spMkLst>
+        </pc:spChg>
+        <pc:picChg chg="add mod">
+          <ac:chgData name="Mathias Thomassen" userId="816551f4347a7810" providerId="LiveId" clId="{8116BDB2-3580-4DD9-9925-6D775CA2397B}" dt="2019-03-15T12:14:02.462" v="136" actId="14100"/>
+          <ac:picMkLst>
+            <pc:docMk/>
+            <pc:sldMk cId="1499206831" sldId="257"/>
+            <ac:picMk id="1026" creationId="{4F13FAD0-4FE5-484B-88BB-F4E987C128F5}"/>
+          </ac:picMkLst>
+        </pc:picChg>
+        <pc:cxnChg chg="add del">
+          <ac:chgData name="Mathias Thomassen" userId="816551f4347a7810" providerId="LiveId" clId="{8116BDB2-3580-4DD9-9925-6D775CA2397B}" dt="2019-03-15T12:11:15.754" v="11"/>
+          <ac:cxnSpMkLst>
+            <pc:docMk/>
+            <pc:sldMk cId="1499206831" sldId="257"/>
+            <ac:cxnSpMk id="21" creationId="{45B5AFC7-2F07-4F7B-9151-E45D7548D8F3}"/>
+          </ac:cxnSpMkLst>
+        </pc:cxnChg>
       </pc:sldChg>
     </pc:docChg>
   </pc:docChgLst>
@@ -4160,6 +4161,291 @@
 <file path=ppt/slides/slide2.xml><?xml version="1.0" encoding="utf-8"?>
 <p:sld xmlns:a="http://schemas.openxmlformats.org/drawingml/2006/main" xmlns:r="http://schemas.openxmlformats.org/officeDocument/2006/relationships" xmlns:p="http://schemas.openxmlformats.org/presentationml/2006/main">
   <p:cSld>
+    <p:spTree>
+      <p:nvGrpSpPr>
+        <p:cNvPr id="1" name=""/>
+        <p:cNvGrpSpPr/>
+        <p:nvPr/>
+      </p:nvGrpSpPr>
+      <p:grpSpPr>
+        <a:xfrm>
+          <a:off x="0" y="0"/>
+          <a:ext cx="0" cy="0"/>
+          <a:chOff x="0" y="0"/>
+          <a:chExt cx="0" cy="0"/>
+        </a:xfrm>
+      </p:grpSpPr>
+      <p:sp>
+        <p:nvSpPr>
+          <p:cNvPr id="2" name="Titel 1">
+            <a:extLst>
+              <a:ext uri="{FF2B5EF4-FFF2-40B4-BE49-F238E27FC236}">
+                <a16:creationId xmlns:a16="http://schemas.microsoft.com/office/drawing/2014/main" id="{4C3382AB-BD7D-4C37-AB3F-A365DB9B78F5}"/>
+              </a:ext>
+            </a:extLst>
+          </p:cNvPr>
+          <p:cNvSpPr>
+            <a:spLocks noGrp="1"/>
+          </p:cNvSpPr>
+          <p:nvPr>
+            <p:ph type="title"/>
+          </p:nvPr>
+        </p:nvSpPr>
+        <p:spPr>
+          <a:xfrm>
+            <a:off x="839788" y="457200"/>
+            <a:ext cx="3932237" cy="1600200"/>
+          </a:xfrm>
+        </p:spPr>
+        <p:txBody>
+          <a:bodyPr/>
+          <a:lstStyle/>
+          <a:p>
+            <a:r>
+              <a:rPr lang="da-DK"/>
+              <a:t>Krav</a:t>
+            </a:r>
+            <a:endParaRPr lang="da-DK" dirty="0"/>
+          </a:p>
+        </p:txBody>
+      </p:sp>
+      <p:sp>
+        <p:nvSpPr>
+          <p:cNvPr id="4" name="Pladsholder til tekst 3">
+            <a:extLst>
+              <a:ext uri="{FF2B5EF4-FFF2-40B4-BE49-F238E27FC236}">
+                <a16:creationId xmlns:a16="http://schemas.microsoft.com/office/drawing/2014/main" id="{BAB46E7B-2003-41AC-ADF2-CB1C7EC0B9A7}"/>
+              </a:ext>
+            </a:extLst>
+          </p:cNvPr>
+          <p:cNvSpPr>
+            <a:spLocks noGrp="1"/>
+          </p:cNvSpPr>
+          <p:nvPr>
+            <p:ph type="body" sz="half" idx="2"/>
+          </p:nvPr>
+        </p:nvSpPr>
+        <p:spPr>
+          <a:xfrm>
+            <a:off x="839788" y="2057400"/>
+            <a:ext cx="3932237" cy="3811588"/>
+          </a:xfrm>
+        </p:spPr>
+        <p:txBody>
+          <a:bodyPr/>
+          <a:lstStyle/>
+          <a:p>
+            <a:r>
+              <a:rPr lang="da-DK"/>
+              <a:t>Funktionelle</a:t>
+            </a:r>
+          </a:p>
+          <a:p>
+            <a:pPr marL="285750" indent="-285750">
+              <a:buFont typeface="Arial" panose="020B0604020202020204" pitchFamily="34" charset="0"/>
+              <a:buChar char="•"/>
+            </a:pPr>
+            <a:r>
+              <a:rPr lang="da-DK"/>
+              <a:t>Skal kunne tilføje personer </a:t>
+            </a:r>
+          </a:p>
+          <a:p>
+            <a:pPr marL="285750" indent="-285750">
+              <a:buFont typeface="Arial" panose="020B0604020202020204" pitchFamily="34" charset="0"/>
+              <a:buChar char="•"/>
+            </a:pPr>
+            <a:r>
+              <a:rPr lang="da-DK"/>
+              <a:t>Holde styr på gæld for disse personer</a:t>
+            </a:r>
+          </a:p>
+          <a:p>
+            <a:pPr marL="285750" indent="-285750">
+              <a:buFont typeface="Arial" panose="020B0604020202020204" pitchFamily="34" charset="0"/>
+              <a:buChar char="•"/>
+            </a:pPr>
+            <a:endParaRPr lang="da-DK"/>
+          </a:p>
+          <a:p>
+            <a:r>
+              <a:rPr lang="da-DK"/>
+              <a:t>Ikke funktionelle:</a:t>
+            </a:r>
+          </a:p>
+          <a:p>
+            <a:pPr marL="285750" indent="-285750">
+              <a:buFont typeface="Arial" panose="020B0604020202020204" pitchFamily="34" charset="0"/>
+              <a:buChar char="•"/>
+            </a:pPr>
+            <a:r>
+              <a:rPr lang="da-DK"/>
+              <a:t>Data skal verificeres</a:t>
+            </a:r>
+          </a:p>
+          <a:p>
+            <a:pPr marL="285750" indent="-285750">
+              <a:buFont typeface="Arial" panose="020B0604020202020204" pitchFamily="34" charset="0"/>
+              <a:buChar char="•"/>
+            </a:pPr>
+            <a:r>
+              <a:rPr lang="da-DK"/>
+              <a:t>Programmet skal ikke crashe ved forkert indtastet data.</a:t>
+            </a:r>
+          </a:p>
+          <a:p>
+            <a:pPr marL="285750" indent="-285750">
+              <a:buFont typeface="Arial" panose="020B0604020202020204" pitchFamily="34" charset="0"/>
+              <a:buChar char="•"/>
+            </a:pPr>
+            <a:r>
+              <a:rPr lang="da-DK"/>
+              <a:t>Programmet skal opdatere data i alle views så data er synkroniseret</a:t>
+            </a:r>
+          </a:p>
+          <a:p>
+            <a:pPr marL="285750" indent="-285750">
+              <a:buFont typeface="Arial" panose="020B0604020202020204" pitchFamily="34" charset="0"/>
+              <a:buChar char="•"/>
+            </a:pPr>
+            <a:endParaRPr lang="da-DK"/>
+          </a:p>
+          <a:p>
+            <a:pPr marL="285750" indent="-285750">
+              <a:buFont typeface="Arial" panose="020B0604020202020204" pitchFamily="34" charset="0"/>
+              <a:buChar char="•"/>
+            </a:pPr>
+            <a:endParaRPr lang="da-DK"/>
+          </a:p>
+          <a:p>
+            <a:endParaRPr lang="da-DK" dirty="0"/>
+          </a:p>
+        </p:txBody>
+      </p:sp>
+      <p:pic>
+        <p:nvPicPr>
+          <p:cNvPr id="6" name="Billede 5">
+            <a:extLst>
+              <a:ext uri="{FF2B5EF4-FFF2-40B4-BE49-F238E27FC236}">
+                <a16:creationId xmlns:a16="http://schemas.microsoft.com/office/drawing/2014/main" id="{25092E60-B830-41CA-89D4-A44D3CAED762}"/>
+              </a:ext>
+            </a:extLst>
+          </p:cNvPr>
+          <p:cNvPicPr>
+            <a:picLocks noChangeAspect="1"/>
+          </p:cNvPicPr>
+          <p:nvPr/>
+        </p:nvPicPr>
+        <p:blipFill>
+          <a:blip r:embed="rId2">
+            <a:extLst>
+              <a:ext uri="{28A0092B-C50C-407E-A947-70E740481C1C}">
+                <a14:useLocalDpi xmlns:a14="http://schemas.microsoft.com/office/drawing/2010/main" val="0"/>
+              </a:ext>
+            </a:extLst>
+          </a:blip>
+          <a:stretch>
+            <a:fillRect/>
+          </a:stretch>
+        </p:blipFill>
+        <p:spPr>
+          <a:xfrm>
+            <a:off x="8742956" y="821818"/>
+            <a:ext cx="2016630" cy="2016630"/>
+          </a:xfrm>
+          <a:prstGeom prst="rect">
+            <a:avLst/>
+          </a:prstGeom>
+        </p:spPr>
+      </p:pic>
+      <p:pic>
+        <p:nvPicPr>
+          <p:cNvPr id="8" name="Billede 7" descr="Et billede, der indeholder vektorgrafik&#10;&#10;Automatisk genereret beskrivelse">
+            <a:extLst>
+              <a:ext uri="{FF2B5EF4-FFF2-40B4-BE49-F238E27FC236}">
+                <a16:creationId xmlns:a16="http://schemas.microsoft.com/office/drawing/2014/main" id="{62C016E6-DB13-4395-BA0D-E76EC04E38E5}"/>
+              </a:ext>
+            </a:extLst>
+          </p:cNvPr>
+          <p:cNvPicPr>
+            <a:picLocks noChangeAspect="1"/>
+          </p:cNvPicPr>
+          <p:nvPr/>
+        </p:nvPicPr>
+        <p:blipFill>
+          <a:blip r:embed="rId3">
+            <a:extLst>
+              <a:ext uri="{28A0092B-C50C-407E-A947-70E740481C1C}">
+                <a14:useLocalDpi xmlns:a14="http://schemas.microsoft.com/office/drawing/2010/main" val="0"/>
+              </a:ext>
+            </a:extLst>
+          </a:blip>
+          <a:stretch>
+            <a:fillRect/>
+          </a:stretch>
+        </p:blipFill>
+        <p:spPr>
+          <a:xfrm>
+            <a:off x="5608565" y="2057400"/>
+            <a:ext cx="2016630" cy="2016630"/>
+          </a:xfrm>
+          <a:prstGeom prst="rect">
+            <a:avLst/>
+          </a:prstGeom>
+        </p:spPr>
+      </p:pic>
+      <p:pic>
+        <p:nvPicPr>
+          <p:cNvPr id="10" name="Billede 9" descr="Et billede, der indeholder vektorgrafik&#10;&#10;Automatisk genereret beskrivelse">
+            <a:extLst>
+              <a:ext uri="{FF2B5EF4-FFF2-40B4-BE49-F238E27FC236}">
+                <a16:creationId xmlns:a16="http://schemas.microsoft.com/office/drawing/2014/main" id="{C55D1133-9B83-4C5E-94CB-5CAF8FAB11EA}"/>
+              </a:ext>
+            </a:extLst>
+          </p:cNvPr>
+          <p:cNvPicPr>
+            <a:picLocks noChangeAspect="1"/>
+          </p:cNvPicPr>
+          <p:nvPr/>
+        </p:nvPicPr>
+        <p:blipFill>
+          <a:blip r:embed="rId4">
+            <a:extLst>
+              <a:ext uri="{28A0092B-C50C-407E-A947-70E740481C1C}">
+                <a14:useLocalDpi xmlns:a14="http://schemas.microsoft.com/office/drawing/2010/main" val="0"/>
+              </a:ext>
+            </a:extLst>
+          </a:blip>
+          <a:stretch>
+            <a:fillRect/>
+          </a:stretch>
+        </p:blipFill>
+        <p:spPr>
+          <a:xfrm>
+            <a:off x="8299078" y="3610703"/>
+            <a:ext cx="2258285" cy="2258285"/>
+          </a:xfrm>
+          <a:prstGeom prst="rect">
+            <a:avLst/>
+          </a:prstGeom>
+        </p:spPr>
+      </p:pic>
+    </p:spTree>
+    <p:extLst>
+      <p:ext uri="{BB962C8B-B14F-4D97-AF65-F5344CB8AC3E}">
+        <p14:creationId xmlns:p14="http://schemas.microsoft.com/office/powerpoint/2010/main" val="3314235661"/>
+      </p:ext>
+    </p:extLst>
+  </p:cSld>
+  <p:clrMapOvr>
+    <a:masterClrMapping/>
+  </p:clrMapOvr>
+</p:sld>
+</file>
+
+<file path=ppt/slides/slide3.xml><?xml version="1.0" encoding="utf-8"?>
+<p:sld xmlns:a="http://schemas.openxmlformats.org/drawingml/2006/main" xmlns:r="http://schemas.openxmlformats.org/officeDocument/2006/relationships" xmlns:p="http://schemas.openxmlformats.org/presentationml/2006/main">
+  <p:cSld>
     <p:bg>
       <p:bgPr>
         <a:solidFill>
@@ -4357,173 +4643,6 @@
     <p:extLst>
       <p:ext uri="{BB962C8B-B14F-4D97-AF65-F5344CB8AC3E}">
         <p14:creationId xmlns:p14="http://schemas.microsoft.com/office/powerpoint/2010/main" val="1499206831"/>
-      </p:ext>
-    </p:extLst>
-  </p:cSld>
-  <p:clrMapOvr>
-    <a:masterClrMapping/>
-  </p:clrMapOvr>
-</p:sld>
-</file>
-
-<file path=ppt/slides/slide3.xml><?xml version="1.0" encoding="utf-8"?>
-<p:sld xmlns:a="http://schemas.openxmlformats.org/drawingml/2006/main" xmlns:r="http://schemas.openxmlformats.org/officeDocument/2006/relationships" xmlns:p="http://schemas.openxmlformats.org/presentationml/2006/main">
-  <p:cSld>
-    <p:spTree>
-      <p:nvGrpSpPr>
-        <p:cNvPr id="1" name=""/>
-        <p:cNvGrpSpPr/>
-        <p:nvPr/>
-      </p:nvGrpSpPr>
-      <p:grpSpPr>
-        <a:xfrm>
-          <a:off x="0" y="0"/>
-          <a:ext cx="0" cy="0"/>
-          <a:chOff x="0" y="0"/>
-          <a:chExt cx="0" cy="0"/>
-        </a:xfrm>
-      </p:grpSpPr>
-      <p:sp>
-        <p:nvSpPr>
-          <p:cNvPr id="2" name="Titel 1">
-            <a:extLst>
-              <a:ext uri="{FF2B5EF4-FFF2-40B4-BE49-F238E27FC236}">
-                <a16:creationId xmlns:a16="http://schemas.microsoft.com/office/drawing/2014/main" id="{4C3382AB-BD7D-4C37-AB3F-A365DB9B78F5}"/>
-              </a:ext>
-            </a:extLst>
-          </p:cNvPr>
-          <p:cNvSpPr>
-            <a:spLocks noGrp="1"/>
-          </p:cNvSpPr>
-          <p:nvPr>
-            <p:ph type="title"/>
-          </p:nvPr>
-        </p:nvSpPr>
-        <p:spPr/>
-        <p:txBody>
-          <a:bodyPr/>
-          <a:lstStyle/>
-          <a:p>
-            <a:r>
-              <a:rPr lang="da-DK" dirty="0"/>
-              <a:t>Krav</a:t>
-            </a:r>
-          </a:p>
-        </p:txBody>
-      </p:sp>
-      <p:sp>
-        <p:nvSpPr>
-          <p:cNvPr id="3" name="Pladsholder til indhold 2">
-            <a:extLst>
-              <a:ext uri="{FF2B5EF4-FFF2-40B4-BE49-F238E27FC236}">
-                <a16:creationId xmlns:a16="http://schemas.microsoft.com/office/drawing/2014/main" id="{2A881AE0-004F-4313-B092-522BDB12A3F9}"/>
-              </a:ext>
-            </a:extLst>
-          </p:cNvPr>
-          <p:cNvSpPr>
-            <a:spLocks noGrp="1"/>
-          </p:cNvSpPr>
-          <p:nvPr>
-            <p:ph idx="1"/>
-          </p:nvPr>
-        </p:nvSpPr>
-        <p:spPr/>
-        <p:txBody>
-          <a:bodyPr/>
-          <a:lstStyle/>
-          <a:p>
-            <a:endParaRPr lang="da-DK" dirty="0"/>
-          </a:p>
-        </p:txBody>
-      </p:sp>
-      <p:sp>
-        <p:nvSpPr>
-          <p:cNvPr id="4" name="Pladsholder til tekst 3">
-            <a:extLst>
-              <a:ext uri="{FF2B5EF4-FFF2-40B4-BE49-F238E27FC236}">
-                <a16:creationId xmlns:a16="http://schemas.microsoft.com/office/drawing/2014/main" id="{BAB46E7B-2003-41AC-ADF2-CB1C7EC0B9A7}"/>
-              </a:ext>
-            </a:extLst>
-          </p:cNvPr>
-          <p:cNvSpPr>
-            <a:spLocks noGrp="1"/>
-          </p:cNvSpPr>
-          <p:nvPr>
-            <p:ph type="body" sz="half" idx="2"/>
-          </p:nvPr>
-        </p:nvSpPr>
-        <p:spPr/>
-        <p:txBody>
-          <a:bodyPr/>
-          <a:lstStyle/>
-          <a:p>
-            <a:r>
-              <a:rPr lang="da-DK" dirty="0"/>
-              <a:t>Funktionelle</a:t>
-            </a:r>
-          </a:p>
-          <a:p>
-            <a:pPr marL="285750" indent="-285750">
-              <a:buFont typeface="Arial" panose="020B0604020202020204" pitchFamily="34" charset="0"/>
-              <a:buChar char="•"/>
-            </a:pPr>
-            <a:r>
-              <a:rPr lang="da-DK" dirty="0"/>
-              <a:t>Skal kunne tilføje personer og holde styr på gæld for disse personer</a:t>
-            </a:r>
-          </a:p>
-          <a:p>
-            <a:r>
-              <a:rPr lang="da-DK" dirty="0"/>
-              <a:t>Ikke funktionelle:</a:t>
-            </a:r>
-          </a:p>
-          <a:p>
-            <a:pPr marL="285750" indent="-285750">
-              <a:buFont typeface="Arial" panose="020B0604020202020204" pitchFamily="34" charset="0"/>
-              <a:buChar char="•"/>
-            </a:pPr>
-            <a:r>
-              <a:rPr lang="da-DK" dirty="0"/>
-              <a:t>Data skal verificeres</a:t>
-            </a:r>
-          </a:p>
-          <a:p>
-            <a:pPr marL="285750" indent="-285750">
-              <a:buFont typeface="Arial" panose="020B0604020202020204" pitchFamily="34" charset="0"/>
-              <a:buChar char="•"/>
-            </a:pPr>
-            <a:r>
-              <a:rPr lang="da-DK" dirty="0"/>
-              <a:t>Programmet skal ikke crashe ved forkert indtastet data.</a:t>
-            </a:r>
-          </a:p>
-          <a:p>
-            <a:pPr marL="285750" indent="-285750">
-              <a:buFont typeface="Arial" panose="020B0604020202020204" pitchFamily="34" charset="0"/>
-              <a:buChar char="•"/>
-            </a:pPr>
-            <a:r>
-              <a:rPr lang="da-DK" dirty="0"/>
-              <a:t>Programmet skal opdatere data i alle views</a:t>
-            </a:r>
-          </a:p>
-          <a:p>
-            <a:pPr marL="285750" indent="-285750">
-              <a:buFont typeface="Arial" panose="020B0604020202020204" pitchFamily="34" charset="0"/>
-              <a:buChar char="•"/>
-            </a:pPr>
-            <a:endParaRPr lang="da-DK" dirty="0"/>
-          </a:p>
-          <a:p>
-            <a:endParaRPr lang="da-DK" dirty="0"/>
-          </a:p>
-        </p:txBody>
-      </p:sp>
-    </p:spTree>
-    <p:extLst>
-      <p:ext uri="{BB962C8B-B14F-4D97-AF65-F5344CB8AC3E}">
-        <p14:creationId xmlns:p14="http://schemas.microsoft.com/office/powerpoint/2010/main" val="3314235661"/>
       </p:ext>
     </p:extLst>
   </p:cSld>
@@ -5288,6 +5407,129 @@
   </p:cSld>
   <p:clrMapOvr>
     <a:overrideClrMapping bg1="dk1" tx1="lt1" bg2="dk2" tx2="lt2" accent1="accent1" accent2="accent2" accent3="accent3" accent4="accent4" accent5="accent5" accent6="accent6" hlink="hlink" folHlink="folHlink"/>
+  </p:clrMapOvr>
+</p:sld>
+</file>
+
+<file path=ppt/slides/slide8.xml><?xml version="1.0" encoding="utf-8"?>
+<p:sld xmlns:a="http://schemas.openxmlformats.org/drawingml/2006/main" xmlns:r="http://schemas.openxmlformats.org/officeDocument/2006/relationships" xmlns:p="http://schemas.openxmlformats.org/presentationml/2006/main">
+  <p:cSld>
+    <p:spTree>
+      <p:nvGrpSpPr>
+        <p:cNvPr id="1" name=""/>
+        <p:cNvGrpSpPr/>
+        <p:nvPr/>
+      </p:nvGrpSpPr>
+      <p:grpSpPr>
+        <a:xfrm>
+          <a:off x="0" y="0"/>
+          <a:ext cx="0" cy="0"/>
+          <a:chOff x="0" y="0"/>
+          <a:chExt cx="0" cy="0"/>
+        </a:xfrm>
+      </p:grpSpPr>
+      <p:sp>
+        <p:nvSpPr>
+          <p:cNvPr id="2" name="Titel 1">
+            <a:extLst>
+              <a:ext uri="{FF2B5EF4-FFF2-40B4-BE49-F238E27FC236}">
+                <a16:creationId xmlns:a16="http://schemas.microsoft.com/office/drawing/2014/main" id="{300BDA6D-1BAB-4E7E-9BFD-E3D6910845EB}"/>
+              </a:ext>
+            </a:extLst>
+          </p:cNvPr>
+          <p:cNvSpPr>
+            <a:spLocks noGrp="1"/>
+          </p:cNvSpPr>
+          <p:nvPr>
+            <p:ph type="title"/>
+          </p:nvPr>
+        </p:nvSpPr>
+        <p:spPr/>
+        <p:txBody>
+          <a:bodyPr/>
+          <a:lstStyle/>
+          <a:p>
+            <a:r>
+              <a:rPr lang="da-DK" dirty="0"/>
+              <a:t>Udfordringer med implementering</a:t>
+            </a:r>
+          </a:p>
+        </p:txBody>
+      </p:sp>
+      <p:sp>
+        <p:nvSpPr>
+          <p:cNvPr id="3" name="Pladsholder til indhold 2">
+            <a:extLst>
+              <a:ext uri="{FF2B5EF4-FFF2-40B4-BE49-F238E27FC236}">
+                <a16:creationId xmlns:a16="http://schemas.microsoft.com/office/drawing/2014/main" id="{F7347697-5E00-4E96-90D6-BD8145EA05E4}"/>
+              </a:ext>
+            </a:extLst>
+          </p:cNvPr>
+          <p:cNvSpPr>
+            <a:spLocks noGrp="1"/>
+          </p:cNvSpPr>
+          <p:nvPr>
+            <p:ph idx="1"/>
+          </p:nvPr>
+        </p:nvSpPr>
+        <p:spPr/>
+        <p:txBody>
+          <a:bodyPr/>
+          <a:lstStyle/>
+          <a:p>
+            <a:r>
+              <a:rPr lang="da-DK" dirty="0"/>
+              <a:t>Opdatering/synkronisering af gæld i de forskellige vinduer/views</a:t>
+            </a:r>
+          </a:p>
+          <a:p>
+            <a:pPr lvl="1"/>
+            <a:r>
+              <a:rPr lang="da-DK" dirty="0"/>
+              <a:t>Overensstemmelse</a:t>
+            </a:r>
+            <a:br>
+              <a:rPr lang="da-DK" dirty="0"/>
+            </a:br>
+            <a:endParaRPr lang="da-DK" dirty="0"/>
+          </a:p>
+          <a:p>
+            <a:r>
+              <a:rPr lang="da-DK" dirty="0"/>
+              <a:t>Binding mellem view og viewmodel</a:t>
+            </a:r>
+          </a:p>
+          <a:p>
+            <a:pPr lvl="1"/>
+            <a:r>
+              <a:rPr lang="da-DK" dirty="0"/>
+              <a:t>Data binding</a:t>
+            </a:r>
+          </a:p>
+          <a:p>
+            <a:pPr lvl="1"/>
+            <a:r>
+              <a:rPr lang="da-DK" dirty="0"/>
+              <a:t>Data context</a:t>
+            </a:r>
+          </a:p>
+          <a:p>
+            <a:pPr marL="0" indent="0">
+              <a:buNone/>
+            </a:pPr>
+            <a:endParaRPr lang="da-DK" dirty="0"/>
+          </a:p>
+        </p:txBody>
+      </p:sp>
+    </p:spTree>
+    <p:extLst>
+      <p:ext uri="{BB962C8B-B14F-4D97-AF65-F5344CB8AC3E}">
+        <p14:creationId xmlns:p14="http://schemas.microsoft.com/office/powerpoint/2010/main" val="3894134063"/>
+      </p:ext>
+    </p:extLst>
+  </p:cSld>
+  <p:clrMapOvr>
+    <a:masterClrMapping/>
   </p:clrMapOvr>
 </p:sld>
 </file>

</xml_diff>